<commit_message>
update weka & report
</commit_message>
<xml_diff>
--- a/Apriori/Report/Apriori Report.pptx
+++ b/Apriori/Report/Apriori Report.pptx
@@ -5,7 +5,7 @@
     <p:sldMasterId id="2147483648" r:id="rId1"/>
   </p:sldMasterIdLst>
   <p:notesMasterIdLst>
-    <p:notesMasterId r:id="rId23"/>
+    <p:notesMasterId r:id="rId27"/>
   </p:notesMasterIdLst>
   <p:sldIdLst>
     <p:sldId id="256" r:id="rId2"/>
@@ -29,6 +29,10 @@
     <p:sldId id="300" r:id="rId20"/>
     <p:sldId id="301" r:id="rId21"/>
     <p:sldId id="302" r:id="rId22"/>
+    <p:sldId id="312" r:id="rId23"/>
+    <p:sldId id="315" r:id="rId24"/>
+    <p:sldId id="311" r:id="rId25"/>
+    <p:sldId id="313" r:id="rId26"/>
   </p:sldIdLst>
   <p:sldSz cx="12192000" cy="6858000"/>
   <p:notesSz cx="6858000" cy="9144000"/>
@@ -217,7 +221,7 @@
           <a:p>
             <a:fld id="{CE947862-FEBF-49FA-A5FA-93929D9EDBC0}" type="datetimeFigureOut">
               <a:rPr lang="zh-TW" altLang="en-US" smtClean="0"/>
-              <a:t>2018/10/18</a:t>
+              <a:t>2018/12/31</a:t>
             </a:fld>
             <a:endParaRPr lang="zh-TW" altLang="en-US"/>
           </a:p>
@@ -783,7 +787,7 @@
           <a:p>
             <a:fld id="{48A87A34-81AB-432B-8DAE-1953F412C126}" type="datetimeFigureOut">
               <a:rPr lang="en-US" dirty="0"/>
-              <a:t>10/18/2018</a:t>
+              <a:t>12/31/2018</a:t>
             </a:fld>
             <a:endParaRPr lang="en-US" dirty="0"/>
           </a:p>
@@ -1045,7 +1049,7 @@
           <a:p>
             <a:fld id="{48A87A34-81AB-432B-8DAE-1953F412C126}" type="datetimeFigureOut">
               <a:rPr lang="en-US" dirty="0"/>
-              <a:t>10/18/2018</a:t>
+              <a:t>12/31/2018</a:t>
             </a:fld>
             <a:endParaRPr lang="en-US" dirty="0"/>
           </a:p>
@@ -1272,7 +1276,7 @@
             <a:fld id="{48A87A34-81AB-432B-8DAE-1953F412C126}" type="datetimeFigureOut">
               <a:rPr lang="en-US" dirty="0"/>
               <a:pPr/>
-              <a:t>10/18/2018</a:t>
+              <a:t>12/31/2018</a:t>
             </a:fld>
             <a:endParaRPr lang="en-US" dirty="0"/>
           </a:p>
@@ -1578,7 +1582,7 @@
             <a:fld id="{48A87A34-81AB-432B-8DAE-1953F412C126}" type="datetimeFigureOut">
               <a:rPr lang="en-US" dirty="0"/>
               <a:pPr/>
-              <a:t>10/18/2018</a:t>
+              <a:t>12/31/2018</a:t>
             </a:fld>
             <a:endParaRPr lang="en-US" dirty="0"/>
           </a:p>
@@ -2047,7 +2051,7 @@
             <a:fld id="{48A87A34-81AB-432B-8DAE-1953F412C126}" type="datetimeFigureOut">
               <a:rPr lang="en-US" dirty="0"/>
               <a:pPr/>
-              <a:t>10/18/2018</a:t>
+              <a:t>12/31/2018</a:t>
             </a:fld>
             <a:endParaRPr lang="en-US" dirty="0"/>
           </a:p>
@@ -2589,7 +2593,7 @@
           <a:p>
             <a:fld id="{48A87A34-81AB-432B-8DAE-1953F412C126}" type="datetimeFigureOut">
               <a:rPr lang="en-US" dirty="0"/>
-              <a:t>10/18/2018</a:t>
+              <a:t>12/31/2018</a:t>
             </a:fld>
             <a:endParaRPr lang="en-US" dirty="0"/>
           </a:p>
@@ -3358,7 +3362,7 @@
           <a:p>
             <a:fld id="{48A87A34-81AB-432B-8DAE-1953F412C126}" type="datetimeFigureOut">
               <a:rPr lang="en-US" dirty="0"/>
-              <a:t>10/18/2018</a:t>
+              <a:t>12/31/2018</a:t>
             </a:fld>
             <a:endParaRPr lang="en-US" dirty="0"/>
           </a:p>
@@ -3528,7 +3532,7 @@
           <a:p>
             <a:fld id="{48A87A34-81AB-432B-8DAE-1953F412C126}" type="datetimeFigureOut">
               <a:rPr lang="en-US" dirty="0"/>
-              <a:t>10/18/2018</a:t>
+              <a:t>12/31/2018</a:t>
             </a:fld>
             <a:endParaRPr lang="en-US" dirty="0"/>
           </a:p>
@@ -3747,7 +3751,7 @@
             <a:fld id="{48A87A34-81AB-432B-8DAE-1953F412C126}" type="datetimeFigureOut">
               <a:rPr lang="en-US" dirty="0"/>
               <a:pPr/>
-              <a:t>10/18/2018</a:t>
+              <a:t>12/31/2018</a:t>
             </a:fld>
             <a:endParaRPr lang="en-US" dirty="0"/>
           </a:p>
@@ -3922,7 +3926,7 @@
           <a:p>
             <a:fld id="{48A87A34-81AB-432B-8DAE-1953F412C126}" type="datetimeFigureOut">
               <a:rPr lang="en-US" dirty="0"/>
-              <a:t>10/18/2018</a:t>
+              <a:t>12/31/2018</a:t>
             </a:fld>
             <a:endParaRPr lang="en-US" dirty="0"/>
           </a:p>
@@ -4207,7 +4211,7 @@
             <a:fld id="{48A87A34-81AB-432B-8DAE-1953F412C126}" type="datetimeFigureOut">
               <a:rPr lang="en-US" dirty="0"/>
               <a:pPr/>
-              <a:t>10/18/2018</a:t>
+              <a:t>12/31/2018</a:t>
             </a:fld>
             <a:endParaRPr lang="en-US" dirty="0"/>
           </a:p>
@@ -4444,7 +4448,7 @@
           <a:p>
             <a:fld id="{48A87A34-81AB-432B-8DAE-1953F412C126}" type="datetimeFigureOut">
               <a:rPr lang="en-US" dirty="0"/>
-              <a:t>10/18/2018</a:t>
+              <a:t>12/31/2018</a:t>
             </a:fld>
             <a:endParaRPr lang="en-US" dirty="0"/>
           </a:p>
@@ -4818,7 +4822,7 @@
           <a:p>
             <a:fld id="{48A87A34-81AB-432B-8DAE-1953F412C126}" type="datetimeFigureOut">
               <a:rPr lang="en-US" dirty="0"/>
-              <a:t>10/18/2018</a:t>
+              <a:t>12/31/2018</a:t>
             </a:fld>
             <a:endParaRPr lang="en-US" dirty="0"/>
           </a:p>
@@ -4931,7 +4935,7 @@
           <a:p>
             <a:fld id="{48A87A34-81AB-432B-8DAE-1953F412C126}" type="datetimeFigureOut">
               <a:rPr lang="en-US" dirty="0"/>
-              <a:t>10/18/2018</a:t>
+              <a:t>12/31/2018</a:t>
             </a:fld>
             <a:endParaRPr lang="en-US" dirty="0"/>
           </a:p>
@@ -5021,7 +5025,7 @@
           <a:p>
             <a:fld id="{48A87A34-81AB-432B-8DAE-1953F412C126}" type="datetimeFigureOut">
               <a:rPr lang="en-US" dirty="0"/>
-              <a:t>10/18/2018</a:t>
+              <a:t>12/31/2018</a:t>
             </a:fld>
             <a:endParaRPr lang="en-US" dirty="0"/>
           </a:p>
@@ -5265,7 +5269,7 @@
           <a:p>
             <a:fld id="{48A87A34-81AB-432B-8DAE-1953F412C126}" type="datetimeFigureOut">
               <a:rPr lang="en-US" dirty="0"/>
-              <a:t>10/18/2018</a:t>
+              <a:t>12/31/2018</a:t>
             </a:fld>
             <a:endParaRPr lang="en-US" dirty="0"/>
           </a:p>
@@ -5517,7 +5521,7 @@
           <a:p>
             <a:fld id="{48A87A34-81AB-432B-8DAE-1953F412C126}" type="datetimeFigureOut">
               <a:rPr lang="en-US" dirty="0"/>
-              <a:t>10/18/2018</a:t>
+              <a:t>12/31/2018</a:t>
             </a:fld>
             <a:endParaRPr lang="en-US" dirty="0"/>
           </a:p>
@@ -5756,7 +5760,7 @@
             <a:fld id="{48A87A34-81AB-432B-8DAE-1953F412C126}" type="datetimeFigureOut">
               <a:rPr lang="en-US" dirty="0"/>
               <a:pPr/>
-              <a:t>10/18/2018</a:t>
+              <a:t>12/31/2018</a:t>
             </a:fld>
             <a:endParaRPr lang="en-US" dirty="0"/>
           </a:p>
@@ -6912,8 +6916,21 @@
                   <a:srgbClr val="002060"/>
                 </a:solidFill>
               </a:rPr>
-              <a:t>Take 0.91ms</a:t>
-            </a:r>
+              <a:t>Take </a:t>
+            </a:r>
+            <a:r>
+              <a:rPr lang="en-US" altLang="zh-TW" b="1" dirty="0" smtClean="0">
+                <a:solidFill>
+                  <a:srgbClr val="002060"/>
+                </a:solidFill>
+              </a:rPr>
+              <a:t>18.02ms</a:t>
+            </a:r>
+            <a:endParaRPr lang="en-US" altLang="zh-TW" b="1" dirty="0">
+              <a:solidFill>
+                <a:srgbClr val="002060"/>
+              </a:solidFill>
+            </a:endParaRPr>
           </a:p>
           <a:p>
             <a:endParaRPr lang="en-US" altLang="zh-TW" dirty="0" smtClean="0"/>
@@ -7125,7 +7142,7 @@
                   <a:srgbClr val="002060"/>
                 </a:solidFill>
               </a:rPr>
-              <a:t>Take 0.91ms</a:t>
+              <a:t>Take 18.02ms</a:t>
             </a:r>
           </a:p>
           <a:p>
@@ -7346,7 +7363,7 @@
                   <a:srgbClr val="002060"/>
                 </a:solidFill>
               </a:rPr>
-              <a:t>Take 0.91ms</a:t>
+              <a:t>Take 18.02ms</a:t>
             </a:r>
           </a:p>
           <a:p>
@@ -7559,7 +7576,7 @@
                   <a:srgbClr val="002060"/>
                 </a:solidFill>
               </a:rPr>
-              <a:t>Take 0.91ms</a:t>
+              <a:t>Take 18.02ms</a:t>
             </a:r>
           </a:p>
           <a:p>
@@ -9183,6 +9200,34 @@
               <a:rPr lang="en-US" altLang="zh-TW" sz="2400" dirty="0" smtClean="0"/>
               <a:t>FP-Growth</a:t>
             </a:r>
+          </a:p>
+          <a:p>
+            <a:r>
+              <a:rPr lang="en-US" altLang="zh-TW" sz="2400" dirty="0"/>
+              <a:t>Conclusion</a:t>
+            </a:r>
+            <a:r>
+              <a:rPr lang="zh-TW" altLang="en-US" sz="2400" dirty="0"/>
+              <a:t> </a:t>
+            </a:r>
+            <a:r>
+              <a:rPr lang="en-US" altLang="zh-TW" sz="2400" dirty="0"/>
+              <a:t>&amp;</a:t>
+            </a:r>
+            <a:r>
+              <a:rPr lang="zh-TW" altLang="en-US" sz="2400" dirty="0"/>
+              <a:t> </a:t>
+            </a:r>
+            <a:r>
+              <a:rPr lang="en-US" altLang="zh-TW" sz="2400" dirty="0" smtClean="0"/>
+              <a:t>observation</a:t>
+            </a:r>
+          </a:p>
+          <a:p>
+            <a:r>
+              <a:rPr lang="en-US" altLang="zh-TW" sz="2400" dirty="0"/>
+              <a:t>WEKA</a:t>
+            </a:r>
             <a:endParaRPr lang="zh-TW" altLang="en-US" sz="2400" dirty="0"/>
           </a:p>
         </p:txBody>
@@ -9690,6 +9735,2684 @@
 </p:sld>
 </file>
 
+<file path=ppt/slides/slide22.xml><?xml version="1.0" encoding="utf-8"?>
+<p:sld xmlns:a="http://schemas.openxmlformats.org/drawingml/2006/main" xmlns:r="http://schemas.openxmlformats.org/officeDocument/2006/relationships" xmlns:p="http://schemas.openxmlformats.org/presentationml/2006/main">
+  <p:cSld>
+    <p:spTree>
+      <p:nvGrpSpPr>
+        <p:cNvPr id="1" name=""/>
+        <p:cNvGrpSpPr/>
+        <p:nvPr/>
+      </p:nvGrpSpPr>
+      <p:grpSpPr>
+        <a:xfrm>
+          <a:off x="0" y="0"/>
+          <a:ext cx="0" cy="0"/>
+          <a:chOff x="0" y="0"/>
+          <a:chExt cx="0" cy="0"/>
+        </a:xfrm>
+      </p:grpSpPr>
+      <p:sp>
+        <p:nvSpPr>
+          <p:cNvPr id="2" name="標題 1"/>
+          <p:cNvSpPr>
+            <a:spLocks noGrp="1"/>
+          </p:cNvSpPr>
+          <p:nvPr>
+            <p:ph type="title"/>
+          </p:nvPr>
+        </p:nvSpPr>
+        <p:spPr>
+          <a:xfrm>
+            <a:off x="685800" y="780998"/>
+            <a:ext cx="10820400" cy="1293028"/>
+          </a:xfrm>
+        </p:spPr>
+        <p:txBody>
+          <a:bodyPr/>
+          <a:lstStyle/>
+          <a:p>
+            <a:pPr algn="l"/>
+            <a:r>
+              <a:rPr lang="en-US" altLang="zh-TW" dirty="0"/>
+              <a:t>Conclusion</a:t>
+            </a:r>
+            <a:r>
+              <a:rPr lang="zh-TW" altLang="en-US" dirty="0"/>
+              <a:t> </a:t>
+            </a:r>
+            <a:r>
+              <a:rPr lang="en-US" altLang="zh-TW" dirty="0"/>
+              <a:t>&amp;</a:t>
+            </a:r>
+            <a:r>
+              <a:rPr lang="zh-TW" altLang="en-US" dirty="0"/>
+              <a:t> </a:t>
+            </a:r>
+            <a:r>
+              <a:rPr lang="en-US" altLang="zh-TW" dirty="0"/>
+              <a:t>observation</a:t>
+            </a:r>
+            <a:endParaRPr lang="zh-TW" altLang="en-US" dirty="0"/>
+          </a:p>
+        </p:txBody>
+      </p:sp>
+      <p:sp>
+        <p:nvSpPr>
+          <p:cNvPr id="3" name="內容版面配置區 2"/>
+          <p:cNvSpPr>
+            <a:spLocks noGrp="1"/>
+          </p:cNvSpPr>
+          <p:nvPr>
+            <p:ph idx="1"/>
+          </p:nvPr>
+        </p:nvSpPr>
+        <p:spPr>
+          <a:xfrm>
+            <a:off x="685800" y="2194560"/>
+            <a:ext cx="10820400" cy="4305993"/>
+          </a:xfrm>
+        </p:spPr>
+        <p:txBody>
+          <a:bodyPr>
+            <a:normAutofit fontScale="92500" lnSpcReduction="10000"/>
+          </a:bodyPr>
+          <a:lstStyle/>
+          <a:p>
+            <a:pPr marL="0" indent="0" algn="ctr">
+              <a:buNone/>
+            </a:pPr>
+            <a:r>
+              <a:rPr lang="zh-TW" altLang="en-US" dirty="0" smtClean="0"/>
+              <a:t>以</a:t>
+            </a:r>
+            <a:r>
+              <a:rPr lang="en-US" altLang="zh-TW" dirty="0" smtClean="0"/>
+              <a:t>IBM</a:t>
+            </a:r>
+            <a:r>
+              <a:rPr lang="zh-TW" altLang="en-US" dirty="0" smtClean="0"/>
+              <a:t>的</a:t>
+            </a:r>
+            <a:r>
+              <a:rPr lang="en-US" altLang="zh-TW" dirty="0" smtClean="0"/>
+              <a:t>Data</a:t>
+            </a:r>
+            <a:r>
+              <a:rPr lang="zh-TW" altLang="en-US" dirty="0" smtClean="0"/>
+              <a:t>為目標分析三個演算法的運算時間</a:t>
+            </a:r>
+            <a:endParaRPr lang="en-US" altLang="zh-TW" dirty="0"/>
+          </a:p>
+          <a:p>
+            <a:endParaRPr lang="en-US" altLang="zh-TW" dirty="0" smtClean="0"/>
+          </a:p>
+          <a:p>
+            <a:endParaRPr lang="en-US" altLang="zh-TW" dirty="0" smtClean="0"/>
+          </a:p>
+          <a:p>
+            <a:endParaRPr lang="en-US" altLang="zh-TW" dirty="0" smtClean="0"/>
+          </a:p>
+          <a:p>
+            <a:endParaRPr lang="en-US" altLang="zh-TW" dirty="0"/>
+          </a:p>
+          <a:p>
+            <a:r>
+              <a:rPr lang="zh-TW" altLang="en-US" dirty="0" smtClean="0"/>
+              <a:t>我們可以清楚發現到傳統</a:t>
+            </a:r>
+            <a:r>
+              <a:rPr lang="en-US" altLang="zh-TW" dirty="0" err="1" smtClean="0"/>
+              <a:t>Apriori</a:t>
+            </a:r>
+            <a:r>
+              <a:rPr lang="zh-TW" altLang="en-US" dirty="0" smtClean="0"/>
+              <a:t>演算法的運算速度，相較於其他兩者是最慢的</a:t>
+            </a:r>
+            <a:endParaRPr lang="en-US" altLang="zh-TW" dirty="0" smtClean="0"/>
+          </a:p>
+          <a:p>
+            <a:r>
+              <a:rPr lang="zh-TW" altLang="en-US" dirty="0" smtClean="0"/>
+              <a:t>而</a:t>
+            </a:r>
+            <a:r>
+              <a:rPr lang="en-US" altLang="zh-TW" dirty="0" smtClean="0"/>
+              <a:t>Hash-Tree</a:t>
+            </a:r>
+            <a:r>
+              <a:rPr lang="zh-TW" altLang="en-US" dirty="0" smtClean="0"/>
+              <a:t>的方式讓人很意外的是居然速度比</a:t>
+            </a:r>
+            <a:r>
+              <a:rPr lang="en-US" altLang="zh-TW" dirty="0" smtClean="0"/>
+              <a:t>FP-Growth</a:t>
+            </a:r>
+            <a:r>
+              <a:rPr lang="zh-TW" altLang="en-US" dirty="0" smtClean="0"/>
+              <a:t>還要更快</a:t>
+            </a:r>
+            <a:endParaRPr lang="en-US" altLang="zh-TW" dirty="0" smtClean="0"/>
+          </a:p>
+          <a:p>
+            <a:r>
+              <a:rPr lang="zh-TW" altLang="en-US" dirty="0" smtClean="0"/>
+              <a:t>而在</a:t>
+            </a:r>
+            <a:r>
+              <a:rPr lang="en-US" altLang="zh-TW" dirty="0" smtClean="0"/>
+              <a:t>IBM</a:t>
+            </a:r>
+            <a:r>
+              <a:rPr lang="zh-TW" altLang="en-US" dirty="0" smtClean="0"/>
+              <a:t>資料集上，</a:t>
+            </a:r>
+            <a:r>
+              <a:rPr lang="en-US" altLang="zh-TW" dirty="0" smtClean="0"/>
+              <a:t>FP-Growth</a:t>
+            </a:r>
+            <a:r>
+              <a:rPr lang="zh-TW" altLang="en-US" dirty="0" smtClean="0"/>
+              <a:t>比起</a:t>
+            </a:r>
+            <a:r>
+              <a:rPr lang="en-US" altLang="zh-TW" dirty="0" err="1" smtClean="0"/>
+              <a:t>Apriori</a:t>
+            </a:r>
+            <a:r>
+              <a:rPr lang="zh-TW" altLang="en-US" dirty="0" smtClean="0"/>
+              <a:t>快上了</a:t>
+            </a:r>
+            <a:r>
+              <a:rPr lang="en-US" altLang="zh-TW" dirty="0" smtClean="0"/>
+              <a:t>90</a:t>
+            </a:r>
+            <a:r>
+              <a:rPr lang="zh-TW" altLang="en-US" dirty="0" smtClean="0"/>
+              <a:t>倍</a:t>
+            </a:r>
+            <a:endParaRPr lang="en-US" altLang="zh-TW" dirty="0" smtClean="0"/>
+          </a:p>
+          <a:p>
+            <a:r>
+              <a:rPr lang="zh-TW" altLang="en-US" dirty="0" smtClean="0"/>
+              <a:t>但是在</a:t>
+            </a:r>
+            <a:r>
+              <a:rPr lang="en-US" altLang="zh-TW" dirty="0" err="1" smtClean="0"/>
+              <a:t>Kaggle</a:t>
+            </a:r>
+            <a:r>
+              <a:rPr lang="zh-TW" altLang="en-US" dirty="0" smtClean="0"/>
+              <a:t>資料</a:t>
+            </a:r>
+            <a:r>
+              <a:rPr lang="zh-TW" altLang="en-US" dirty="0"/>
+              <a:t>集上，</a:t>
+            </a:r>
+            <a:r>
+              <a:rPr lang="en-US" altLang="zh-TW" dirty="0"/>
+              <a:t>FP-Growth</a:t>
+            </a:r>
+            <a:r>
+              <a:rPr lang="zh-TW" altLang="en-US" dirty="0"/>
+              <a:t>比起</a:t>
+            </a:r>
+            <a:r>
+              <a:rPr lang="en-US" altLang="zh-TW" dirty="0" err="1" smtClean="0"/>
+              <a:t>Apriori</a:t>
+            </a:r>
+            <a:r>
+              <a:rPr lang="zh-TW" altLang="en-US" dirty="0" smtClean="0"/>
+              <a:t>只快上</a:t>
+            </a:r>
+            <a:r>
+              <a:rPr lang="en-US" altLang="zh-TW" dirty="0"/>
+              <a:t>2</a:t>
+            </a:r>
+            <a:r>
+              <a:rPr lang="zh-TW" altLang="en-US" dirty="0" smtClean="0"/>
+              <a:t>倍</a:t>
+            </a:r>
+            <a:endParaRPr lang="en-US" altLang="zh-TW" dirty="0" smtClean="0"/>
+          </a:p>
+          <a:p>
+            <a:r>
+              <a:rPr lang="zh-TW" altLang="en-US" dirty="0" smtClean="0"/>
+              <a:t>在根據前面資料集的</a:t>
+            </a:r>
+            <a:r>
+              <a:rPr lang="en-US" altLang="zh-TW" dirty="0" err="1" smtClean="0"/>
+              <a:t>itemset</a:t>
+            </a:r>
+            <a:r>
+              <a:rPr lang="zh-TW" altLang="en-US" dirty="0" smtClean="0"/>
+              <a:t>數量來看，</a:t>
+            </a:r>
+            <a:r>
+              <a:rPr lang="en-US" altLang="zh-TW" dirty="0" err="1" smtClean="0"/>
+              <a:t>kaggle</a:t>
+            </a:r>
+            <a:r>
+              <a:rPr lang="zh-TW" altLang="en-US" dirty="0" smtClean="0"/>
+              <a:t>的</a:t>
+            </a:r>
+            <a:r>
+              <a:rPr lang="en-US" altLang="zh-TW" dirty="0" err="1" smtClean="0"/>
+              <a:t>itemset</a:t>
+            </a:r>
+            <a:r>
+              <a:rPr lang="zh-TW" altLang="en-US" dirty="0" smtClean="0"/>
+              <a:t>整整是</a:t>
+            </a:r>
+            <a:r>
+              <a:rPr lang="en-US" altLang="zh-TW" dirty="0" smtClean="0"/>
+              <a:t>IBM</a:t>
+            </a:r>
+            <a:r>
+              <a:rPr lang="zh-TW" altLang="en-US" dirty="0" smtClean="0"/>
+              <a:t>的</a:t>
+            </a:r>
+            <a:r>
+              <a:rPr lang="en-US" altLang="zh-TW" dirty="0" smtClean="0"/>
+              <a:t>10</a:t>
+            </a:r>
+            <a:r>
+              <a:rPr lang="zh-TW" altLang="en-US" dirty="0" smtClean="0"/>
+              <a:t>倍</a:t>
+            </a:r>
+            <a:endParaRPr lang="en-US" altLang="zh-TW" dirty="0" smtClean="0"/>
+          </a:p>
+          <a:p>
+            <a:r>
+              <a:rPr lang="zh-TW" altLang="en-US" dirty="0" smtClean="0"/>
+              <a:t>因此可以推斷在越大的資料中使用</a:t>
+            </a:r>
+            <a:r>
+              <a:rPr lang="en-US" altLang="zh-TW" dirty="0" smtClean="0"/>
+              <a:t>FP-Growth</a:t>
+            </a:r>
+            <a:r>
+              <a:rPr lang="zh-TW" altLang="en-US" dirty="0" smtClean="0"/>
+              <a:t>效能改善可能不是那麼的明顯</a:t>
+            </a:r>
+            <a:endParaRPr lang="en-US" altLang="zh-TW" dirty="0" smtClean="0"/>
+          </a:p>
+          <a:p>
+            <a:endParaRPr lang="en-US" altLang="zh-TW" dirty="0"/>
+          </a:p>
+        </p:txBody>
+      </p:sp>
+      <p:graphicFrame>
+        <p:nvGraphicFramePr>
+          <p:cNvPr id="4" name="表格 3"/>
+          <p:cNvGraphicFramePr>
+            <a:graphicFrameLocks noGrp="1"/>
+          </p:cNvGraphicFramePr>
+          <p:nvPr/>
+        </p:nvGraphicFramePr>
+        <p:xfrm>
+          <a:off x="1541549" y="2656531"/>
+          <a:ext cx="8128000" cy="1112520"/>
+        </p:xfrm>
+        <a:graphic>
+          <a:graphicData uri="http://schemas.openxmlformats.org/drawingml/2006/table">
+            <a:tbl>
+              <a:tblPr firstRow="1" bandRow="1">
+                <a:tableStyleId>{5C22544A-7EE6-4342-B048-85BDC9FD1C3A}</a:tableStyleId>
+              </a:tblPr>
+              <a:tblGrid>
+                <a:gridCol w="2032000">
+                  <a:extLst>
+                    <a:ext uri="{9D8B030D-6E8A-4147-A177-3AD203B41FA5}">
+                      <a16:colId xmlns:a16="http://schemas.microsoft.com/office/drawing/2014/main" val="3606595524"/>
+                    </a:ext>
+                  </a:extLst>
+                </a:gridCol>
+                <a:gridCol w="2032000">
+                  <a:extLst>
+                    <a:ext uri="{9D8B030D-6E8A-4147-A177-3AD203B41FA5}">
+                      <a16:colId xmlns:a16="http://schemas.microsoft.com/office/drawing/2014/main" val="2440063392"/>
+                    </a:ext>
+                  </a:extLst>
+                </a:gridCol>
+                <a:gridCol w="2032000">
+                  <a:extLst>
+                    <a:ext uri="{9D8B030D-6E8A-4147-A177-3AD203B41FA5}">
+                      <a16:colId xmlns:a16="http://schemas.microsoft.com/office/drawing/2014/main" val="3155920357"/>
+                    </a:ext>
+                  </a:extLst>
+                </a:gridCol>
+                <a:gridCol w="2032000">
+                  <a:extLst>
+                    <a:ext uri="{9D8B030D-6E8A-4147-A177-3AD203B41FA5}">
+                      <a16:colId xmlns:a16="http://schemas.microsoft.com/office/drawing/2014/main" val="1624363804"/>
+                    </a:ext>
+                  </a:extLst>
+                </a:gridCol>
+              </a:tblGrid>
+              <a:tr h="370840">
+                <a:tc>
+                  <a:txBody>
+                    <a:bodyPr/>
+                    <a:lstStyle/>
+                    <a:p>
+                      <a:pPr algn="ctr"/>
+                      <a:endParaRPr lang="zh-TW" altLang="en-US" dirty="0"/>
+                    </a:p>
+                  </a:txBody>
+                  <a:tcPr/>
+                </a:tc>
+                <a:tc>
+                  <a:txBody>
+                    <a:bodyPr/>
+                    <a:lstStyle/>
+                    <a:p>
+                      <a:pPr algn="ctr"/>
+                      <a:r>
+                        <a:rPr lang="en-US" altLang="zh-TW" dirty="0" err="1" smtClean="0"/>
+                        <a:t>Apriori</a:t>
+                      </a:r>
+                      <a:endParaRPr lang="zh-TW" altLang="en-US" dirty="0"/>
+                    </a:p>
+                  </a:txBody>
+                  <a:tcPr/>
+                </a:tc>
+                <a:tc>
+                  <a:txBody>
+                    <a:bodyPr/>
+                    <a:lstStyle/>
+                    <a:p>
+                      <a:pPr algn="ctr"/>
+                      <a:r>
+                        <a:rPr lang="en-US" altLang="zh-TW" dirty="0" smtClean="0"/>
+                        <a:t>Hash-Tree</a:t>
+                      </a:r>
+                      <a:endParaRPr lang="zh-TW" altLang="en-US" dirty="0"/>
+                    </a:p>
+                  </a:txBody>
+                  <a:tcPr/>
+                </a:tc>
+                <a:tc>
+                  <a:txBody>
+                    <a:bodyPr/>
+                    <a:lstStyle/>
+                    <a:p>
+                      <a:pPr algn="ctr"/>
+                      <a:r>
+                        <a:rPr lang="en-US" altLang="zh-TW" dirty="0" smtClean="0"/>
+                        <a:t>FP-Growth</a:t>
+                      </a:r>
+                      <a:endParaRPr lang="zh-TW" altLang="en-US" dirty="0"/>
+                    </a:p>
+                  </a:txBody>
+                  <a:tcPr/>
+                </a:tc>
+                <a:extLst>
+                  <a:ext uri="{0D108BD9-81ED-4DB2-BD59-A6C34878D82A}">
+                    <a16:rowId xmlns:a16="http://schemas.microsoft.com/office/drawing/2014/main" val="476469338"/>
+                  </a:ext>
+                </a:extLst>
+              </a:tr>
+              <a:tr h="370840">
+                <a:tc>
+                  <a:txBody>
+                    <a:bodyPr/>
+                    <a:lstStyle/>
+                    <a:p>
+                      <a:pPr algn="ctr"/>
+                      <a:r>
+                        <a:rPr lang="en-US" altLang="zh-TW" dirty="0" smtClean="0"/>
+                        <a:t>IBM</a:t>
+                      </a:r>
+                      <a:endParaRPr lang="zh-TW" altLang="en-US" dirty="0"/>
+                    </a:p>
+                  </a:txBody>
+                  <a:tcPr/>
+                </a:tc>
+                <a:tc>
+                  <a:txBody>
+                    <a:bodyPr/>
+                    <a:lstStyle/>
+                    <a:p>
+                      <a:pPr algn="ctr"/>
+                      <a:r>
+                        <a:rPr lang="en-US" altLang="zh-TW" dirty="0" smtClean="0"/>
+                        <a:t>0.91(</a:t>
+                      </a:r>
+                      <a:r>
+                        <a:rPr lang="en-US" altLang="zh-TW" dirty="0" err="1" smtClean="0"/>
+                        <a:t>ms</a:t>
+                      </a:r>
+                      <a:r>
+                        <a:rPr lang="en-US" altLang="zh-TW" dirty="0" smtClean="0"/>
+                        <a:t>)</a:t>
+                      </a:r>
+                      <a:endParaRPr lang="zh-TW" altLang="en-US" dirty="0"/>
+                    </a:p>
+                  </a:txBody>
+                  <a:tcPr/>
+                </a:tc>
+                <a:tc>
+                  <a:txBody>
+                    <a:bodyPr/>
+                    <a:lstStyle/>
+                    <a:p>
+                      <a:pPr marL="0" marR="0" indent="0" algn="ctr" defTabSz="914400" rtl="0" eaLnBrk="1" fontAlgn="auto" latinLnBrk="0" hangingPunct="1">
+                        <a:lnSpc>
+                          <a:spcPct val="100000"/>
+                        </a:lnSpc>
+                        <a:spcBef>
+                          <a:spcPts val="0"/>
+                        </a:spcBef>
+                        <a:spcAft>
+                          <a:spcPts val="0"/>
+                        </a:spcAft>
+                        <a:buClrTx/>
+                        <a:buSzTx/>
+                        <a:buFontTx/>
+                        <a:buNone/>
+                        <a:tabLst/>
+                        <a:defRPr/>
+                      </a:pPr>
+                      <a:r>
+                        <a:rPr lang="en-US" altLang="zh-TW" dirty="0" smtClean="0"/>
+                        <a:t>0.008</a:t>
+                      </a:r>
+                      <a:r>
+                        <a:rPr lang="en-US" altLang="zh-TW" dirty="0" smtClean="0"/>
+                        <a:t>(</a:t>
+                      </a:r>
+                      <a:r>
+                        <a:rPr lang="en-US" altLang="zh-TW" dirty="0" err="1" smtClean="0"/>
+                        <a:t>ms</a:t>
+                      </a:r>
+                      <a:r>
+                        <a:rPr lang="en-US" altLang="zh-TW" dirty="0" smtClean="0"/>
+                        <a:t>)</a:t>
+                      </a:r>
+                      <a:endParaRPr lang="zh-TW" altLang="en-US" dirty="0" smtClean="0"/>
+                    </a:p>
+                  </a:txBody>
+                  <a:tcPr/>
+                </a:tc>
+                <a:tc>
+                  <a:txBody>
+                    <a:bodyPr/>
+                    <a:lstStyle/>
+                    <a:p>
+                      <a:pPr marL="0" marR="0" indent="0" algn="ctr" defTabSz="914400" rtl="0" eaLnBrk="1" fontAlgn="auto" latinLnBrk="0" hangingPunct="1">
+                        <a:lnSpc>
+                          <a:spcPct val="100000"/>
+                        </a:lnSpc>
+                        <a:spcBef>
+                          <a:spcPts val="0"/>
+                        </a:spcBef>
+                        <a:spcAft>
+                          <a:spcPts val="0"/>
+                        </a:spcAft>
+                        <a:buClrTx/>
+                        <a:buSzTx/>
+                        <a:buFontTx/>
+                        <a:buNone/>
+                        <a:tabLst/>
+                        <a:defRPr/>
+                      </a:pPr>
+                      <a:r>
+                        <a:rPr lang="en-US" altLang="zh-TW" dirty="0" smtClean="0"/>
+                        <a:t>0.01</a:t>
+                      </a:r>
+                      <a:r>
+                        <a:rPr lang="en-US" altLang="zh-TW" dirty="0" smtClean="0"/>
+                        <a:t>(</a:t>
+                      </a:r>
+                      <a:r>
+                        <a:rPr lang="en-US" altLang="zh-TW" dirty="0" err="1" smtClean="0"/>
+                        <a:t>ms</a:t>
+                      </a:r>
+                      <a:r>
+                        <a:rPr lang="en-US" altLang="zh-TW" dirty="0" smtClean="0"/>
+                        <a:t>)</a:t>
+                      </a:r>
+                      <a:endParaRPr lang="zh-TW" altLang="en-US" dirty="0" smtClean="0"/>
+                    </a:p>
+                  </a:txBody>
+                  <a:tcPr/>
+                </a:tc>
+                <a:extLst>
+                  <a:ext uri="{0D108BD9-81ED-4DB2-BD59-A6C34878D82A}">
+                    <a16:rowId xmlns:a16="http://schemas.microsoft.com/office/drawing/2014/main" val="3786179521"/>
+                  </a:ext>
+                </a:extLst>
+              </a:tr>
+              <a:tr h="370840">
+                <a:tc>
+                  <a:txBody>
+                    <a:bodyPr/>
+                    <a:lstStyle/>
+                    <a:p>
+                      <a:pPr algn="ctr"/>
+                      <a:r>
+                        <a:rPr lang="en-US" altLang="zh-TW" dirty="0" err="1" smtClean="0"/>
+                        <a:t>Kaggle</a:t>
+                      </a:r>
+                      <a:endParaRPr lang="zh-TW" altLang="en-US" dirty="0"/>
+                    </a:p>
+                  </a:txBody>
+                  <a:tcPr/>
+                </a:tc>
+                <a:tc>
+                  <a:txBody>
+                    <a:bodyPr/>
+                    <a:lstStyle/>
+                    <a:p>
+                      <a:pPr algn="ctr"/>
+                      <a:r>
+                        <a:rPr lang="en-US" altLang="zh-TW" dirty="0" smtClean="0"/>
+                        <a:t>18.02</a:t>
+                      </a:r>
+                      <a:r>
+                        <a:rPr lang="en-US" altLang="zh-TW" dirty="0" smtClean="0"/>
+                        <a:t>(</a:t>
+                      </a:r>
+                      <a:r>
+                        <a:rPr lang="en-US" altLang="zh-TW" dirty="0" err="1" smtClean="0"/>
+                        <a:t>ms</a:t>
+                      </a:r>
+                      <a:r>
+                        <a:rPr lang="en-US" altLang="zh-TW" dirty="0" smtClean="0"/>
+                        <a:t>)</a:t>
+                      </a:r>
+                      <a:endParaRPr lang="zh-TW" altLang="en-US" dirty="0"/>
+                    </a:p>
+                  </a:txBody>
+                  <a:tcPr/>
+                </a:tc>
+                <a:tc>
+                  <a:txBody>
+                    <a:bodyPr/>
+                    <a:lstStyle/>
+                    <a:p>
+                      <a:pPr algn="ctr"/>
+                      <a:r>
+                        <a:rPr lang="en-US" altLang="zh-TW" dirty="0" smtClean="0"/>
+                        <a:t>X</a:t>
+                      </a:r>
+                      <a:endParaRPr lang="zh-TW" altLang="en-US" dirty="0"/>
+                    </a:p>
+                  </a:txBody>
+                  <a:tcPr/>
+                </a:tc>
+                <a:tc>
+                  <a:txBody>
+                    <a:bodyPr/>
+                    <a:lstStyle/>
+                    <a:p>
+                      <a:pPr algn="ctr"/>
+                      <a:r>
+                        <a:rPr lang="en-US" altLang="zh-TW" dirty="0" smtClean="0"/>
+                        <a:t>9.09</a:t>
+                      </a:r>
+                      <a:r>
+                        <a:rPr lang="en-US" altLang="zh-TW" dirty="0" smtClean="0"/>
+                        <a:t>(</a:t>
+                      </a:r>
+                      <a:r>
+                        <a:rPr lang="en-US" altLang="zh-TW" dirty="0" err="1" smtClean="0"/>
+                        <a:t>ms</a:t>
+                      </a:r>
+                      <a:r>
+                        <a:rPr lang="en-US" altLang="zh-TW" dirty="0" smtClean="0"/>
+                        <a:t>)</a:t>
+                      </a:r>
+                      <a:endParaRPr lang="zh-TW" altLang="en-US" dirty="0"/>
+                    </a:p>
+                  </a:txBody>
+                  <a:tcPr/>
+                </a:tc>
+                <a:extLst>
+                  <a:ext uri="{0D108BD9-81ED-4DB2-BD59-A6C34878D82A}">
+                    <a16:rowId xmlns:a16="http://schemas.microsoft.com/office/drawing/2014/main" val="4207554321"/>
+                  </a:ext>
+                </a:extLst>
+              </a:tr>
+            </a:tbl>
+          </a:graphicData>
+        </a:graphic>
+      </p:graphicFrame>
+    </p:spTree>
+    <p:extLst>
+      <p:ext uri="{BB962C8B-B14F-4D97-AF65-F5344CB8AC3E}">
+        <p14:creationId xmlns:p14="http://schemas.microsoft.com/office/powerpoint/2010/main" val="2091538385"/>
+      </p:ext>
+    </p:extLst>
+  </p:cSld>
+  <p:clrMapOvr>
+    <a:masterClrMapping/>
+  </p:clrMapOvr>
+</p:sld>
+</file>
+
+<file path=ppt/slides/slide23.xml><?xml version="1.0" encoding="utf-8"?>
+<p:sld xmlns:a="http://schemas.openxmlformats.org/drawingml/2006/main" xmlns:r="http://schemas.openxmlformats.org/officeDocument/2006/relationships" xmlns:p="http://schemas.openxmlformats.org/presentationml/2006/main">
+  <p:cSld>
+    <p:spTree>
+      <p:nvGrpSpPr>
+        <p:cNvPr id="1" name=""/>
+        <p:cNvGrpSpPr/>
+        <p:nvPr/>
+      </p:nvGrpSpPr>
+      <p:grpSpPr>
+        <a:xfrm>
+          <a:off x="0" y="0"/>
+          <a:ext cx="0" cy="0"/>
+          <a:chOff x="0" y="0"/>
+          <a:chExt cx="0" cy="0"/>
+        </a:xfrm>
+      </p:grpSpPr>
+      <p:sp>
+        <p:nvSpPr>
+          <p:cNvPr id="2" name="標題 1"/>
+          <p:cNvSpPr>
+            <a:spLocks noGrp="1"/>
+          </p:cNvSpPr>
+          <p:nvPr>
+            <p:ph type="title"/>
+          </p:nvPr>
+        </p:nvSpPr>
+        <p:spPr>
+          <a:xfrm>
+            <a:off x="685800" y="780998"/>
+            <a:ext cx="10820400" cy="1293028"/>
+          </a:xfrm>
+        </p:spPr>
+        <p:txBody>
+          <a:bodyPr/>
+          <a:lstStyle/>
+          <a:p>
+            <a:pPr algn="l"/>
+            <a:r>
+              <a:rPr lang="en-US" altLang="zh-TW" dirty="0"/>
+              <a:t>memory usage</a:t>
+            </a:r>
+            <a:endParaRPr lang="zh-TW" altLang="en-US" dirty="0"/>
+          </a:p>
+        </p:txBody>
+      </p:sp>
+      <p:sp>
+        <p:nvSpPr>
+          <p:cNvPr id="3" name="內容版面配置區 2"/>
+          <p:cNvSpPr>
+            <a:spLocks noGrp="1"/>
+          </p:cNvSpPr>
+          <p:nvPr>
+            <p:ph idx="1"/>
+          </p:nvPr>
+        </p:nvSpPr>
+        <p:spPr>
+          <a:xfrm>
+            <a:off x="685799" y="2194560"/>
+            <a:ext cx="10594571" cy="4024125"/>
+          </a:xfrm>
+        </p:spPr>
+        <p:txBody>
+          <a:bodyPr>
+            <a:normAutofit/>
+          </a:bodyPr>
+          <a:lstStyle/>
+          <a:p>
+            <a:r>
+              <a:rPr lang="zh-TW" altLang="en-US" dirty="0" smtClean="0"/>
+              <a:t>使用</a:t>
+            </a:r>
+            <a:r>
+              <a:rPr lang="en-US" altLang="zh-TW" dirty="0" err="1" smtClean="0"/>
+              <a:t>Ipython</a:t>
+            </a:r>
+            <a:r>
+              <a:rPr lang="zh-TW" altLang="en-US" dirty="0" smtClean="0"/>
+              <a:t>的</a:t>
+            </a:r>
+            <a:r>
+              <a:rPr lang="en-US" altLang="zh-TW" dirty="0" smtClean="0"/>
+              <a:t>%</a:t>
+            </a:r>
+            <a:r>
+              <a:rPr lang="en-US" altLang="zh-TW" dirty="0" err="1" smtClean="0"/>
+              <a:t>memit</a:t>
+            </a:r>
+            <a:r>
+              <a:rPr lang="zh-TW" altLang="en-US" dirty="0" smtClean="0"/>
+              <a:t>剖析並比較佔用的記憶體</a:t>
+            </a:r>
+            <a:endParaRPr lang="en-US" altLang="zh-TW" dirty="0" smtClean="0"/>
+          </a:p>
+          <a:p>
+            <a:endParaRPr lang="en-US" altLang="zh-TW" dirty="0"/>
+          </a:p>
+          <a:p>
+            <a:endParaRPr lang="en-US" altLang="zh-TW" dirty="0" smtClean="0"/>
+          </a:p>
+          <a:p>
+            <a:endParaRPr lang="en-US" altLang="zh-TW" dirty="0"/>
+          </a:p>
+          <a:p>
+            <a:endParaRPr lang="en-US" altLang="zh-TW" dirty="0" smtClean="0"/>
+          </a:p>
+          <a:p>
+            <a:endParaRPr lang="en-US" altLang="zh-TW" dirty="0"/>
+          </a:p>
+          <a:p>
+            <a:r>
+              <a:rPr lang="zh-TW" altLang="en-US" dirty="0" smtClean="0"/>
+              <a:t>很明顯的可以發現</a:t>
+            </a:r>
+            <a:r>
+              <a:rPr lang="en-US" altLang="zh-TW" dirty="0" smtClean="0"/>
+              <a:t>Hash-Tree</a:t>
+            </a:r>
+            <a:r>
+              <a:rPr lang="zh-TW" altLang="en-US" dirty="0" smtClean="0"/>
+              <a:t>所佔用的記憶體最多，與前一張表對比可以發現</a:t>
+            </a:r>
+            <a:endParaRPr lang="en-US" altLang="zh-TW" dirty="0" smtClean="0"/>
+          </a:p>
+          <a:p>
+            <a:pPr marL="0" indent="0">
+              <a:buNone/>
+            </a:pPr>
+            <a:r>
+              <a:rPr lang="zh-TW" altLang="en-US" dirty="0" smtClean="0"/>
+              <a:t>   </a:t>
+            </a:r>
+            <a:r>
+              <a:rPr lang="en-US" altLang="zh-TW" dirty="0" smtClean="0"/>
+              <a:t>Hash-Tree</a:t>
+            </a:r>
+            <a:r>
+              <a:rPr lang="zh-TW" altLang="en-US" dirty="0" smtClean="0"/>
+              <a:t>算是一個以空間換取時間效能的策略</a:t>
+            </a:r>
+            <a:r>
+              <a:rPr lang="zh-TW" altLang="en-US" dirty="0"/>
+              <a:t>，</a:t>
+            </a:r>
+            <a:r>
+              <a:rPr lang="zh-TW" altLang="en-US" dirty="0" smtClean="0"/>
+              <a:t>而</a:t>
+            </a:r>
+            <a:r>
+              <a:rPr lang="en-US" altLang="zh-TW" dirty="0" err="1" smtClean="0"/>
+              <a:t>Apriori</a:t>
+            </a:r>
+            <a:r>
+              <a:rPr lang="zh-TW" altLang="en-US" dirty="0" smtClean="0"/>
+              <a:t>所佔的記憶體最少</a:t>
+            </a:r>
+            <a:endParaRPr lang="en-US" altLang="zh-TW" dirty="0" smtClean="0"/>
+          </a:p>
+          <a:p>
+            <a:pPr marL="0" indent="0">
+              <a:buNone/>
+            </a:pPr>
+            <a:endParaRPr lang="en-US" altLang="zh-TW" dirty="0" smtClean="0"/>
+          </a:p>
+          <a:p>
+            <a:endParaRPr lang="en-US" altLang="zh-TW" dirty="0" smtClean="0"/>
+          </a:p>
+          <a:p>
+            <a:endParaRPr lang="en-US" altLang="zh-TW" dirty="0" smtClean="0"/>
+          </a:p>
+          <a:p>
+            <a:pPr lvl="1">
+              <a:buFont typeface="Wingdings" panose="05000000000000000000" pitchFamily="2" charset="2"/>
+              <a:buChar char="u"/>
+            </a:pPr>
+            <a:endParaRPr lang="zh-TW" altLang="en-US" dirty="0"/>
+          </a:p>
+        </p:txBody>
+      </p:sp>
+      <p:graphicFrame>
+        <p:nvGraphicFramePr>
+          <p:cNvPr id="6" name="表格 5"/>
+          <p:cNvGraphicFramePr>
+            <a:graphicFrameLocks noGrp="1"/>
+          </p:cNvGraphicFramePr>
+          <p:nvPr>
+            <p:extLst>
+              <p:ext uri="{D42A27DB-BD31-4B8C-83A1-F6EECF244321}">
+                <p14:modId xmlns:p14="http://schemas.microsoft.com/office/powerpoint/2010/main" val="3514507297"/>
+              </p:ext>
+            </p:extLst>
+          </p:nvPr>
+        </p:nvGraphicFramePr>
+        <p:xfrm>
+          <a:off x="967970" y="2648218"/>
+          <a:ext cx="9398000" cy="1835522"/>
+        </p:xfrm>
+        <a:graphic>
+          <a:graphicData uri="http://schemas.openxmlformats.org/drawingml/2006/table">
+            <a:tbl>
+              <a:tblPr firstRow="1" bandRow="1">
+                <a:tableStyleId>{5C22544A-7EE6-4342-B048-85BDC9FD1C3A}</a:tableStyleId>
+              </a:tblPr>
+              <a:tblGrid>
+                <a:gridCol w="2349500">
+                  <a:extLst>
+                    <a:ext uri="{9D8B030D-6E8A-4147-A177-3AD203B41FA5}">
+                      <a16:colId xmlns:a16="http://schemas.microsoft.com/office/drawing/2014/main" val="3606595524"/>
+                    </a:ext>
+                  </a:extLst>
+                </a:gridCol>
+                <a:gridCol w="2349500">
+                  <a:extLst>
+                    <a:ext uri="{9D8B030D-6E8A-4147-A177-3AD203B41FA5}">
+                      <a16:colId xmlns:a16="http://schemas.microsoft.com/office/drawing/2014/main" val="2440063392"/>
+                    </a:ext>
+                  </a:extLst>
+                </a:gridCol>
+                <a:gridCol w="2349500">
+                  <a:extLst>
+                    <a:ext uri="{9D8B030D-6E8A-4147-A177-3AD203B41FA5}">
+                      <a16:colId xmlns:a16="http://schemas.microsoft.com/office/drawing/2014/main" val="3155920357"/>
+                    </a:ext>
+                  </a:extLst>
+                </a:gridCol>
+                <a:gridCol w="2349500">
+                  <a:extLst>
+                    <a:ext uri="{9D8B030D-6E8A-4147-A177-3AD203B41FA5}">
+                      <a16:colId xmlns:a16="http://schemas.microsoft.com/office/drawing/2014/main" val="1624363804"/>
+                    </a:ext>
+                  </a:extLst>
+                </a:gridCol>
+              </a:tblGrid>
+              <a:tr h="555362">
+                <a:tc>
+                  <a:txBody>
+                    <a:bodyPr/>
+                    <a:lstStyle/>
+                    <a:p>
+                      <a:pPr algn="ctr"/>
+                      <a:endParaRPr lang="zh-TW" altLang="en-US" dirty="0"/>
+                    </a:p>
+                  </a:txBody>
+                  <a:tcPr/>
+                </a:tc>
+                <a:tc>
+                  <a:txBody>
+                    <a:bodyPr/>
+                    <a:lstStyle/>
+                    <a:p>
+                      <a:pPr algn="ctr"/>
+                      <a:r>
+                        <a:rPr lang="en-US" altLang="zh-TW" dirty="0" err="1" smtClean="0"/>
+                        <a:t>Apriori</a:t>
+                      </a:r>
+                      <a:endParaRPr lang="zh-TW" altLang="en-US" dirty="0"/>
+                    </a:p>
+                  </a:txBody>
+                  <a:tcPr/>
+                </a:tc>
+                <a:tc>
+                  <a:txBody>
+                    <a:bodyPr/>
+                    <a:lstStyle/>
+                    <a:p>
+                      <a:pPr algn="ctr"/>
+                      <a:r>
+                        <a:rPr lang="en-US" altLang="zh-TW" dirty="0" smtClean="0"/>
+                        <a:t>Hash-Tree</a:t>
+                      </a:r>
+                      <a:endParaRPr lang="zh-TW" altLang="en-US" dirty="0"/>
+                    </a:p>
+                  </a:txBody>
+                  <a:tcPr/>
+                </a:tc>
+                <a:tc>
+                  <a:txBody>
+                    <a:bodyPr/>
+                    <a:lstStyle/>
+                    <a:p>
+                      <a:pPr algn="ctr"/>
+                      <a:r>
+                        <a:rPr lang="en-US" altLang="zh-TW" dirty="0" smtClean="0"/>
+                        <a:t>FP-Growth</a:t>
+                      </a:r>
+                      <a:endParaRPr lang="zh-TW" altLang="en-US" dirty="0"/>
+                    </a:p>
+                  </a:txBody>
+                  <a:tcPr/>
+                </a:tc>
+                <a:extLst>
+                  <a:ext uri="{0D108BD9-81ED-4DB2-BD59-A6C34878D82A}">
+                    <a16:rowId xmlns:a16="http://schemas.microsoft.com/office/drawing/2014/main" val="476469338"/>
+                  </a:ext>
+                </a:extLst>
+              </a:tr>
+              <a:tr h="555362">
+                <a:tc>
+                  <a:txBody>
+                    <a:bodyPr/>
+                    <a:lstStyle/>
+                    <a:p>
+                      <a:pPr algn="ctr"/>
+                      <a:r>
+                        <a:rPr lang="en-US" altLang="zh-TW" dirty="0" smtClean="0"/>
+                        <a:t>IBM</a:t>
+                      </a:r>
+                      <a:endParaRPr lang="zh-TW" altLang="en-US" dirty="0"/>
+                    </a:p>
+                  </a:txBody>
+                  <a:tcPr/>
+                </a:tc>
+                <a:tc>
+                  <a:txBody>
+                    <a:bodyPr/>
+                    <a:lstStyle/>
+                    <a:p>
+                      <a:pPr algn="ctr"/>
+                      <a:r>
+                        <a:rPr lang="en-US" altLang="zh-TW" dirty="0" smtClean="0"/>
+                        <a:t>87.67 </a:t>
+                      </a:r>
+                      <a:r>
+                        <a:rPr lang="en-US" altLang="zh-TW" dirty="0" err="1" smtClean="0"/>
+                        <a:t>MiB</a:t>
+                      </a:r>
+                      <a:endParaRPr lang="en-US" altLang="zh-TW" dirty="0" smtClean="0"/>
+                    </a:p>
+                    <a:p>
+                      <a:pPr algn="ctr"/>
+                      <a:r>
+                        <a:rPr lang="en-US" altLang="zh-TW" dirty="0" smtClean="0"/>
+                        <a:t>increment: 0.00 </a:t>
+                      </a:r>
+                      <a:r>
+                        <a:rPr lang="en-US" altLang="zh-TW" dirty="0" err="1" smtClean="0"/>
+                        <a:t>MiB</a:t>
+                      </a:r>
+                      <a:endParaRPr lang="zh-TW" altLang="en-US" dirty="0"/>
+                    </a:p>
+                  </a:txBody>
+                  <a:tcPr/>
+                </a:tc>
+                <a:tc>
+                  <a:txBody>
+                    <a:bodyPr/>
+                    <a:lstStyle/>
+                    <a:p>
+                      <a:pPr marL="0" marR="0" indent="0" algn="ctr" defTabSz="914400" rtl="0" eaLnBrk="1" fontAlgn="auto" latinLnBrk="0" hangingPunct="1">
+                        <a:lnSpc>
+                          <a:spcPct val="100000"/>
+                        </a:lnSpc>
+                        <a:spcBef>
+                          <a:spcPts val="0"/>
+                        </a:spcBef>
+                        <a:spcAft>
+                          <a:spcPts val="0"/>
+                        </a:spcAft>
+                        <a:buClrTx/>
+                        <a:buSzTx/>
+                        <a:buFontTx/>
+                        <a:buNone/>
+                        <a:tabLst/>
+                        <a:defRPr/>
+                      </a:pPr>
+                      <a:r>
+                        <a:rPr lang="en-US" altLang="zh-TW" dirty="0" smtClean="0"/>
+                        <a:t>89.51 </a:t>
+                      </a:r>
+                      <a:r>
+                        <a:rPr lang="en-US" altLang="zh-TW" dirty="0" err="1" smtClean="0"/>
+                        <a:t>MiB</a:t>
+                      </a:r>
+                      <a:endParaRPr lang="en-US" altLang="zh-TW" dirty="0" smtClean="0"/>
+                    </a:p>
+                    <a:p>
+                      <a:pPr marL="0" marR="0" indent="0" algn="ctr" defTabSz="914400" rtl="0" eaLnBrk="1" fontAlgn="auto" latinLnBrk="0" hangingPunct="1">
+                        <a:lnSpc>
+                          <a:spcPct val="100000"/>
+                        </a:lnSpc>
+                        <a:spcBef>
+                          <a:spcPts val="0"/>
+                        </a:spcBef>
+                        <a:spcAft>
+                          <a:spcPts val="0"/>
+                        </a:spcAft>
+                        <a:buClrTx/>
+                        <a:buSzTx/>
+                        <a:buFontTx/>
+                        <a:buNone/>
+                        <a:tabLst/>
+                        <a:defRPr/>
+                      </a:pPr>
+                      <a:r>
+                        <a:rPr lang="en-US" altLang="zh-TW" dirty="0" smtClean="0"/>
+                        <a:t>increment: 0.05 </a:t>
+                      </a:r>
+                      <a:r>
+                        <a:rPr lang="en-US" altLang="zh-TW" dirty="0" err="1" smtClean="0"/>
+                        <a:t>MiB</a:t>
+                      </a:r>
+                      <a:endParaRPr lang="zh-TW" altLang="en-US" dirty="0" smtClean="0"/>
+                    </a:p>
+                  </a:txBody>
+                  <a:tcPr/>
+                </a:tc>
+                <a:tc>
+                  <a:txBody>
+                    <a:bodyPr/>
+                    <a:lstStyle/>
+                    <a:p>
+                      <a:pPr marL="0" marR="0" indent="0" algn="ctr" defTabSz="914400" rtl="0" eaLnBrk="1" fontAlgn="auto" latinLnBrk="0" hangingPunct="1">
+                        <a:lnSpc>
+                          <a:spcPct val="100000"/>
+                        </a:lnSpc>
+                        <a:spcBef>
+                          <a:spcPts val="0"/>
+                        </a:spcBef>
+                        <a:spcAft>
+                          <a:spcPts val="0"/>
+                        </a:spcAft>
+                        <a:buClrTx/>
+                        <a:buSzTx/>
+                        <a:buFontTx/>
+                        <a:buNone/>
+                        <a:tabLst/>
+                        <a:defRPr/>
+                      </a:pPr>
+                      <a:r>
+                        <a:rPr lang="en-US" altLang="zh-TW" dirty="0" smtClean="0"/>
+                        <a:t>89.15 </a:t>
+                      </a:r>
+                      <a:r>
+                        <a:rPr lang="en-US" altLang="zh-TW" dirty="0" err="1" smtClean="0"/>
+                        <a:t>MiB</a:t>
+                      </a:r>
+                      <a:endParaRPr lang="en-US" altLang="zh-TW" dirty="0" smtClean="0"/>
+                    </a:p>
+                    <a:p>
+                      <a:pPr marL="0" marR="0" indent="0" algn="ctr" defTabSz="914400" rtl="0" eaLnBrk="1" fontAlgn="auto" latinLnBrk="0" hangingPunct="1">
+                        <a:lnSpc>
+                          <a:spcPct val="100000"/>
+                        </a:lnSpc>
+                        <a:spcBef>
+                          <a:spcPts val="0"/>
+                        </a:spcBef>
+                        <a:spcAft>
+                          <a:spcPts val="0"/>
+                        </a:spcAft>
+                        <a:buClrTx/>
+                        <a:buSzTx/>
+                        <a:buFontTx/>
+                        <a:buNone/>
+                        <a:tabLst/>
+                        <a:defRPr/>
+                      </a:pPr>
+                      <a:r>
+                        <a:rPr lang="en-US" altLang="zh-TW" dirty="0" smtClean="0"/>
+                        <a:t>increment: 0.06 </a:t>
+                      </a:r>
+                      <a:r>
+                        <a:rPr lang="en-US" altLang="zh-TW" dirty="0" err="1" smtClean="0"/>
+                        <a:t>MiB</a:t>
+                      </a:r>
+                      <a:endParaRPr lang="zh-TW" altLang="en-US" dirty="0" smtClean="0"/>
+                    </a:p>
+                  </a:txBody>
+                  <a:tcPr/>
+                </a:tc>
+                <a:extLst>
+                  <a:ext uri="{0D108BD9-81ED-4DB2-BD59-A6C34878D82A}">
+                    <a16:rowId xmlns:a16="http://schemas.microsoft.com/office/drawing/2014/main" val="3786179521"/>
+                  </a:ext>
+                </a:extLst>
+              </a:tr>
+              <a:tr h="555362">
+                <a:tc>
+                  <a:txBody>
+                    <a:bodyPr/>
+                    <a:lstStyle/>
+                    <a:p>
+                      <a:pPr algn="ctr"/>
+                      <a:r>
+                        <a:rPr lang="en-US" altLang="zh-TW" dirty="0" err="1" smtClean="0"/>
+                        <a:t>Kaggle</a:t>
+                      </a:r>
+                      <a:endParaRPr lang="zh-TW" altLang="en-US" dirty="0"/>
+                    </a:p>
+                  </a:txBody>
+                  <a:tcPr/>
+                </a:tc>
+                <a:tc>
+                  <a:txBody>
+                    <a:bodyPr/>
+                    <a:lstStyle/>
+                    <a:p>
+                      <a:pPr algn="ctr"/>
+                      <a:r>
+                        <a:rPr lang="en-US" altLang="zh-TW" dirty="0" smtClean="0"/>
+                        <a:t>87.50 </a:t>
+                      </a:r>
+                      <a:r>
+                        <a:rPr lang="en-US" altLang="zh-TW" dirty="0" err="1" smtClean="0"/>
+                        <a:t>MiB</a:t>
+                      </a:r>
+                      <a:endParaRPr lang="en-US" altLang="zh-TW" dirty="0" smtClean="0"/>
+                    </a:p>
+                    <a:p>
+                      <a:pPr algn="ctr"/>
+                      <a:r>
+                        <a:rPr lang="en-US" altLang="zh-TW" dirty="0" smtClean="0"/>
+                        <a:t>increment: 0.14 </a:t>
+                      </a:r>
+                      <a:r>
+                        <a:rPr lang="en-US" altLang="zh-TW" dirty="0" err="1" smtClean="0"/>
+                        <a:t>MiB</a:t>
+                      </a:r>
+                      <a:endParaRPr lang="zh-TW" altLang="en-US" dirty="0"/>
+                    </a:p>
+                  </a:txBody>
+                  <a:tcPr/>
+                </a:tc>
+                <a:tc>
+                  <a:txBody>
+                    <a:bodyPr/>
+                    <a:lstStyle/>
+                    <a:p>
+                      <a:pPr algn="ctr"/>
+                      <a:r>
+                        <a:rPr lang="en-US" altLang="zh-TW" dirty="0" smtClean="0"/>
+                        <a:t>X</a:t>
+                      </a:r>
+                      <a:endParaRPr lang="zh-TW" altLang="en-US" dirty="0"/>
+                    </a:p>
+                  </a:txBody>
+                  <a:tcPr/>
+                </a:tc>
+                <a:tc>
+                  <a:txBody>
+                    <a:bodyPr/>
+                    <a:lstStyle/>
+                    <a:p>
+                      <a:pPr algn="ctr"/>
+                      <a:r>
+                        <a:rPr lang="en-US" altLang="zh-TW" dirty="0" smtClean="0"/>
+                        <a:t>89.09 </a:t>
+                      </a:r>
+                      <a:r>
+                        <a:rPr lang="en-US" altLang="zh-TW" dirty="0" err="1" smtClean="0"/>
+                        <a:t>MiB</a:t>
+                      </a:r>
+                      <a:endParaRPr lang="en-US" altLang="zh-TW" dirty="0" smtClean="0"/>
+                    </a:p>
+                    <a:p>
+                      <a:pPr algn="ctr"/>
+                      <a:r>
+                        <a:rPr lang="en-US" altLang="zh-TW" dirty="0" smtClean="0"/>
+                        <a:t>increment: 0.06 </a:t>
+                      </a:r>
+                      <a:r>
+                        <a:rPr lang="en-US" altLang="zh-TW" dirty="0" err="1" smtClean="0"/>
+                        <a:t>MiB</a:t>
+                      </a:r>
+                      <a:endParaRPr lang="zh-TW" altLang="en-US" dirty="0"/>
+                    </a:p>
+                  </a:txBody>
+                  <a:tcPr/>
+                </a:tc>
+                <a:extLst>
+                  <a:ext uri="{0D108BD9-81ED-4DB2-BD59-A6C34878D82A}">
+                    <a16:rowId xmlns:a16="http://schemas.microsoft.com/office/drawing/2014/main" val="4207554321"/>
+                  </a:ext>
+                </a:extLst>
+              </a:tr>
+            </a:tbl>
+          </a:graphicData>
+        </a:graphic>
+      </p:graphicFrame>
+    </p:spTree>
+    <p:extLst>
+      <p:ext uri="{BB962C8B-B14F-4D97-AF65-F5344CB8AC3E}">
+        <p14:creationId xmlns:p14="http://schemas.microsoft.com/office/powerpoint/2010/main" val="2591046746"/>
+      </p:ext>
+    </p:extLst>
+  </p:cSld>
+  <p:clrMapOvr>
+    <a:masterClrMapping/>
+  </p:clrMapOvr>
+</p:sld>
+</file>
+
+<file path=ppt/slides/slide24.xml><?xml version="1.0" encoding="utf-8"?>
+<p:sld xmlns:a="http://schemas.openxmlformats.org/drawingml/2006/main" xmlns:r="http://schemas.openxmlformats.org/officeDocument/2006/relationships" xmlns:p="http://schemas.openxmlformats.org/presentationml/2006/main">
+  <p:cSld>
+    <p:spTree>
+      <p:nvGrpSpPr>
+        <p:cNvPr id="1" name=""/>
+        <p:cNvGrpSpPr/>
+        <p:nvPr/>
+      </p:nvGrpSpPr>
+      <p:grpSpPr>
+        <a:xfrm>
+          <a:off x="0" y="0"/>
+          <a:ext cx="0" cy="0"/>
+          <a:chOff x="0" y="0"/>
+          <a:chExt cx="0" cy="0"/>
+        </a:xfrm>
+      </p:grpSpPr>
+      <p:sp>
+        <p:nvSpPr>
+          <p:cNvPr id="2" name="標題 1"/>
+          <p:cNvSpPr>
+            <a:spLocks noGrp="1"/>
+          </p:cNvSpPr>
+          <p:nvPr>
+            <p:ph type="title"/>
+          </p:nvPr>
+        </p:nvSpPr>
+        <p:spPr>
+          <a:xfrm>
+            <a:off x="685800" y="780998"/>
+            <a:ext cx="10820400" cy="1293028"/>
+          </a:xfrm>
+        </p:spPr>
+        <p:txBody>
+          <a:bodyPr/>
+          <a:lstStyle/>
+          <a:p>
+            <a:pPr algn="l"/>
+            <a:r>
+              <a:rPr lang="en-US" altLang="zh-TW" dirty="0" smtClean="0"/>
+              <a:t>Conclusion</a:t>
+            </a:r>
+            <a:r>
+              <a:rPr lang="zh-TW" altLang="en-US" dirty="0" smtClean="0"/>
+              <a:t> </a:t>
+            </a:r>
+            <a:r>
+              <a:rPr lang="en-US" altLang="zh-TW" dirty="0" smtClean="0"/>
+              <a:t>&amp;</a:t>
+            </a:r>
+            <a:r>
+              <a:rPr lang="zh-TW" altLang="en-US" dirty="0" smtClean="0"/>
+              <a:t> </a:t>
+            </a:r>
+            <a:r>
+              <a:rPr lang="en-US" altLang="zh-TW" dirty="0"/>
+              <a:t>observation</a:t>
+            </a:r>
+            <a:endParaRPr lang="zh-TW" altLang="en-US" dirty="0"/>
+          </a:p>
+        </p:txBody>
+      </p:sp>
+      <p:sp>
+        <p:nvSpPr>
+          <p:cNvPr id="3" name="內容版面配置區 2"/>
+          <p:cNvSpPr>
+            <a:spLocks noGrp="1"/>
+          </p:cNvSpPr>
+          <p:nvPr>
+            <p:ph idx="1"/>
+          </p:nvPr>
+        </p:nvSpPr>
+        <p:spPr>
+          <a:xfrm>
+            <a:off x="685800" y="2194560"/>
+            <a:ext cx="10820400" cy="4024125"/>
+          </a:xfrm>
+        </p:spPr>
+        <p:txBody>
+          <a:bodyPr>
+            <a:normAutofit/>
+          </a:bodyPr>
+          <a:lstStyle/>
+          <a:p>
+            <a:pPr marL="0" indent="0" algn="ctr">
+              <a:buNone/>
+            </a:pPr>
+            <a:r>
+              <a:rPr lang="zh-TW" altLang="en-US" dirty="0" smtClean="0"/>
+              <a:t>以</a:t>
+            </a:r>
+            <a:r>
+              <a:rPr lang="en-US" altLang="zh-TW" dirty="0" smtClean="0"/>
+              <a:t>IBM</a:t>
+            </a:r>
+            <a:r>
+              <a:rPr lang="zh-TW" altLang="en-US" dirty="0" smtClean="0"/>
+              <a:t>的</a:t>
+            </a:r>
+            <a:r>
+              <a:rPr lang="en-US" altLang="zh-TW" dirty="0" smtClean="0"/>
+              <a:t>Data</a:t>
+            </a:r>
+            <a:r>
+              <a:rPr lang="zh-TW" altLang="en-US" dirty="0" smtClean="0"/>
+              <a:t>為目標分析三個演算法的結果</a:t>
+            </a:r>
+            <a:endParaRPr lang="en-US" altLang="zh-TW" dirty="0" smtClean="0"/>
+          </a:p>
+          <a:p>
+            <a:pPr marL="0" indent="0" algn="ctr">
+              <a:buNone/>
+            </a:pPr>
+            <a:r>
+              <a:rPr lang="en-US" altLang="zh-TW" dirty="0" smtClean="0"/>
+              <a:t>[</a:t>
+            </a:r>
+            <a:r>
+              <a:rPr lang="en-US" altLang="zh-TW" dirty="0" smtClean="0">
+                <a:solidFill>
+                  <a:srgbClr val="C00000"/>
+                </a:solidFill>
+              </a:rPr>
+              <a:t>Freq-itemSet1</a:t>
+            </a:r>
+            <a:r>
+              <a:rPr lang="zh-TW" altLang="en-US" dirty="0" smtClean="0"/>
+              <a:t> </a:t>
+            </a:r>
+            <a:r>
+              <a:rPr lang="en-US" altLang="zh-TW" dirty="0" smtClean="0"/>
+              <a:t>,…,</a:t>
+            </a:r>
+            <a:r>
+              <a:rPr lang="en-US" altLang="zh-TW" dirty="0"/>
+              <a:t> </a:t>
+            </a:r>
+            <a:r>
+              <a:rPr lang="en-US" altLang="zh-TW" dirty="0" err="1">
+                <a:solidFill>
+                  <a:srgbClr val="C00000"/>
+                </a:solidFill>
+              </a:rPr>
+              <a:t>Freq-itemSetN</a:t>
+            </a:r>
+            <a:r>
+              <a:rPr lang="en-US" altLang="zh-TW" dirty="0" smtClean="0"/>
+              <a:t>]</a:t>
+            </a:r>
+          </a:p>
+          <a:p>
+            <a:endParaRPr lang="en-US" altLang="zh-TW" dirty="0"/>
+          </a:p>
+          <a:p>
+            <a:endParaRPr lang="en-US" altLang="zh-TW" dirty="0" smtClean="0"/>
+          </a:p>
+          <a:p>
+            <a:endParaRPr lang="en-US" altLang="zh-TW" dirty="0" smtClean="0"/>
+          </a:p>
+          <a:p>
+            <a:r>
+              <a:rPr lang="zh-TW" altLang="en-US" dirty="0" smtClean="0"/>
+              <a:t>我們可以清楚發現在</a:t>
+            </a:r>
+            <a:r>
+              <a:rPr lang="en-US" altLang="zh-TW" dirty="0" err="1" smtClean="0"/>
+              <a:t>Kaggle</a:t>
+            </a:r>
+            <a:r>
+              <a:rPr lang="zh-TW" altLang="en-US" dirty="0" smtClean="0"/>
+              <a:t>資料集中，不管在哪一種演算法下</a:t>
+            </a:r>
+            <a:r>
+              <a:rPr lang="en-US" altLang="zh-TW" dirty="0">
+                <a:solidFill>
+                  <a:srgbClr val="C00000"/>
+                </a:solidFill>
+              </a:rPr>
+              <a:t>freq-itemset2</a:t>
+            </a:r>
+            <a:r>
+              <a:rPr lang="zh-TW" altLang="en-US" dirty="0" smtClean="0"/>
+              <a:t>始終是所有</a:t>
+            </a:r>
+            <a:r>
+              <a:rPr lang="en-US" altLang="zh-TW" dirty="0" err="1">
+                <a:solidFill>
+                  <a:srgbClr val="C00000"/>
+                </a:solidFill>
+              </a:rPr>
+              <a:t>freq-itemset</a:t>
+            </a:r>
+            <a:r>
+              <a:rPr lang="zh-TW" altLang="en-US" dirty="0" smtClean="0"/>
+              <a:t>中數量最多的，也許是因為資料集的數目夠大而且互相牽引的關係夠多，產生眾多的</a:t>
+            </a:r>
+            <a:r>
+              <a:rPr lang="en-US" altLang="zh-TW" dirty="0" smtClean="0">
+                <a:solidFill>
+                  <a:srgbClr val="C00000"/>
+                </a:solidFill>
+              </a:rPr>
+              <a:t>freq-itemset2</a:t>
+            </a:r>
+            <a:endParaRPr lang="en-US" altLang="zh-TW" dirty="0" smtClean="0"/>
+          </a:p>
+        </p:txBody>
+      </p:sp>
+      <p:graphicFrame>
+        <p:nvGraphicFramePr>
+          <p:cNvPr id="4" name="表格 3"/>
+          <p:cNvGraphicFramePr>
+            <a:graphicFrameLocks noGrp="1"/>
+          </p:cNvGraphicFramePr>
+          <p:nvPr>
+            <p:extLst>
+              <p:ext uri="{D42A27DB-BD31-4B8C-83A1-F6EECF244321}">
+                <p14:modId xmlns:p14="http://schemas.microsoft.com/office/powerpoint/2010/main" val="2641534713"/>
+              </p:ext>
+            </p:extLst>
+          </p:nvPr>
+        </p:nvGraphicFramePr>
+        <p:xfrm>
+          <a:off x="1524923" y="3094102"/>
+          <a:ext cx="8128000" cy="1112520"/>
+        </p:xfrm>
+        <a:graphic>
+          <a:graphicData uri="http://schemas.openxmlformats.org/drawingml/2006/table">
+            <a:tbl>
+              <a:tblPr firstRow="1" bandRow="1">
+                <a:tableStyleId>{5C22544A-7EE6-4342-B048-85BDC9FD1C3A}</a:tableStyleId>
+              </a:tblPr>
+              <a:tblGrid>
+                <a:gridCol w="2032000">
+                  <a:extLst>
+                    <a:ext uri="{9D8B030D-6E8A-4147-A177-3AD203B41FA5}">
+                      <a16:colId xmlns:a16="http://schemas.microsoft.com/office/drawing/2014/main" val="3606595524"/>
+                    </a:ext>
+                  </a:extLst>
+                </a:gridCol>
+                <a:gridCol w="2032000">
+                  <a:extLst>
+                    <a:ext uri="{9D8B030D-6E8A-4147-A177-3AD203B41FA5}">
+                      <a16:colId xmlns:a16="http://schemas.microsoft.com/office/drawing/2014/main" val="2440063392"/>
+                    </a:ext>
+                  </a:extLst>
+                </a:gridCol>
+                <a:gridCol w="2032000">
+                  <a:extLst>
+                    <a:ext uri="{9D8B030D-6E8A-4147-A177-3AD203B41FA5}">
+                      <a16:colId xmlns:a16="http://schemas.microsoft.com/office/drawing/2014/main" val="3155920357"/>
+                    </a:ext>
+                  </a:extLst>
+                </a:gridCol>
+                <a:gridCol w="2032000">
+                  <a:extLst>
+                    <a:ext uri="{9D8B030D-6E8A-4147-A177-3AD203B41FA5}">
+                      <a16:colId xmlns:a16="http://schemas.microsoft.com/office/drawing/2014/main" val="1624363804"/>
+                    </a:ext>
+                  </a:extLst>
+                </a:gridCol>
+              </a:tblGrid>
+              <a:tr h="370840">
+                <a:tc>
+                  <a:txBody>
+                    <a:bodyPr/>
+                    <a:lstStyle/>
+                    <a:p>
+                      <a:pPr algn="ctr"/>
+                      <a:endParaRPr lang="zh-TW" altLang="en-US" dirty="0"/>
+                    </a:p>
+                  </a:txBody>
+                  <a:tcPr/>
+                </a:tc>
+                <a:tc>
+                  <a:txBody>
+                    <a:bodyPr/>
+                    <a:lstStyle/>
+                    <a:p>
+                      <a:pPr algn="ctr"/>
+                      <a:r>
+                        <a:rPr lang="en-US" altLang="zh-TW" dirty="0" err="1" smtClean="0"/>
+                        <a:t>Apriori</a:t>
+                      </a:r>
+                      <a:endParaRPr lang="zh-TW" altLang="en-US" dirty="0"/>
+                    </a:p>
+                  </a:txBody>
+                  <a:tcPr/>
+                </a:tc>
+                <a:tc>
+                  <a:txBody>
+                    <a:bodyPr/>
+                    <a:lstStyle/>
+                    <a:p>
+                      <a:pPr algn="ctr"/>
+                      <a:r>
+                        <a:rPr lang="en-US" altLang="zh-TW" dirty="0" smtClean="0"/>
+                        <a:t>Hash-Tree</a:t>
+                      </a:r>
+                      <a:endParaRPr lang="zh-TW" altLang="en-US" dirty="0"/>
+                    </a:p>
+                  </a:txBody>
+                  <a:tcPr/>
+                </a:tc>
+                <a:tc>
+                  <a:txBody>
+                    <a:bodyPr/>
+                    <a:lstStyle/>
+                    <a:p>
+                      <a:pPr algn="ctr"/>
+                      <a:r>
+                        <a:rPr lang="en-US" altLang="zh-TW" dirty="0" smtClean="0"/>
+                        <a:t>FP-Growth</a:t>
+                      </a:r>
+                      <a:endParaRPr lang="zh-TW" altLang="en-US" dirty="0"/>
+                    </a:p>
+                  </a:txBody>
+                  <a:tcPr/>
+                </a:tc>
+                <a:extLst>
+                  <a:ext uri="{0D108BD9-81ED-4DB2-BD59-A6C34878D82A}">
+                    <a16:rowId xmlns:a16="http://schemas.microsoft.com/office/drawing/2014/main" val="476469338"/>
+                  </a:ext>
+                </a:extLst>
+              </a:tr>
+              <a:tr h="370840">
+                <a:tc>
+                  <a:txBody>
+                    <a:bodyPr/>
+                    <a:lstStyle/>
+                    <a:p>
+                      <a:pPr algn="ctr"/>
+                      <a:r>
+                        <a:rPr lang="en-US" altLang="zh-TW" dirty="0" smtClean="0"/>
+                        <a:t>IBM</a:t>
+                      </a:r>
+                      <a:endParaRPr lang="zh-TW" altLang="en-US" dirty="0"/>
+                    </a:p>
+                  </a:txBody>
+                  <a:tcPr/>
+                </a:tc>
+                <a:tc>
+                  <a:txBody>
+                    <a:bodyPr/>
+                    <a:lstStyle/>
+                    <a:p>
+                      <a:pPr algn="ctr"/>
+                      <a:r>
+                        <a:rPr lang="en-US" altLang="zh-TW" dirty="0" smtClean="0"/>
+                        <a:t>[35,17,9,2]</a:t>
+                      </a:r>
+                      <a:endParaRPr lang="zh-TW" altLang="en-US" dirty="0"/>
+                    </a:p>
+                  </a:txBody>
+                  <a:tcPr/>
+                </a:tc>
+                <a:tc>
+                  <a:txBody>
+                    <a:bodyPr/>
+                    <a:lstStyle/>
+                    <a:p>
+                      <a:pPr marL="0" marR="0" indent="0" algn="ctr" defTabSz="914400" rtl="0" eaLnBrk="1" fontAlgn="auto" latinLnBrk="0" hangingPunct="1">
+                        <a:lnSpc>
+                          <a:spcPct val="100000"/>
+                        </a:lnSpc>
+                        <a:spcBef>
+                          <a:spcPts val="0"/>
+                        </a:spcBef>
+                        <a:spcAft>
+                          <a:spcPts val="0"/>
+                        </a:spcAft>
+                        <a:buClrTx/>
+                        <a:buSzTx/>
+                        <a:buFontTx/>
+                        <a:buNone/>
+                        <a:tabLst/>
+                        <a:defRPr/>
+                      </a:pPr>
+                      <a:r>
+                        <a:rPr lang="en-US" altLang="zh-TW" dirty="0" smtClean="0"/>
+                        <a:t>[35,11,5,1]</a:t>
+                      </a:r>
+                      <a:endParaRPr lang="zh-TW" altLang="en-US" dirty="0" smtClean="0"/>
+                    </a:p>
+                  </a:txBody>
+                  <a:tcPr/>
+                </a:tc>
+                <a:tc>
+                  <a:txBody>
+                    <a:bodyPr/>
+                    <a:lstStyle/>
+                    <a:p>
+                      <a:pPr marL="0" marR="0" indent="0" algn="ctr" defTabSz="914400" rtl="0" eaLnBrk="1" fontAlgn="auto" latinLnBrk="0" hangingPunct="1">
+                        <a:lnSpc>
+                          <a:spcPct val="100000"/>
+                        </a:lnSpc>
+                        <a:spcBef>
+                          <a:spcPts val="0"/>
+                        </a:spcBef>
+                        <a:spcAft>
+                          <a:spcPts val="0"/>
+                        </a:spcAft>
+                        <a:buClrTx/>
+                        <a:buSzTx/>
+                        <a:buFontTx/>
+                        <a:buNone/>
+                        <a:tabLst/>
+                        <a:defRPr/>
+                      </a:pPr>
+                      <a:r>
+                        <a:rPr lang="en-US" altLang="zh-TW" dirty="0" smtClean="0"/>
+                        <a:t>[20,4,1]</a:t>
+                      </a:r>
+                      <a:endParaRPr lang="zh-TW" altLang="en-US" dirty="0" smtClean="0"/>
+                    </a:p>
+                  </a:txBody>
+                  <a:tcPr/>
+                </a:tc>
+                <a:extLst>
+                  <a:ext uri="{0D108BD9-81ED-4DB2-BD59-A6C34878D82A}">
+                    <a16:rowId xmlns:a16="http://schemas.microsoft.com/office/drawing/2014/main" val="3786179521"/>
+                  </a:ext>
+                </a:extLst>
+              </a:tr>
+              <a:tr h="370840">
+                <a:tc>
+                  <a:txBody>
+                    <a:bodyPr/>
+                    <a:lstStyle/>
+                    <a:p>
+                      <a:pPr algn="ctr"/>
+                      <a:r>
+                        <a:rPr lang="en-US" altLang="zh-TW" dirty="0" err="1" smtClean="0"/>
+                        <a:t>Kaggle</a:t>
+                      </a:r>
+                      <a:endParaRPr lang="zh-TW" altLang="en-US" dirty="0"/>
+                    </a:p>
+                  </a:txBody>
+                  <a:tcPr/>
+                </a:tc>
+                <a:tc>
+                  <a:txBody>
+                    <a:bodyPr/>
+                    <a:lstStyle/>
+                    <a:p>
+                      <a:pPr algn="ctr"/>
+                      <a:r>
+                        <a:rPr lang="en-US" altLang="zh-TW" dirty="0" smtClean="0"/>
+                        <a:t>[41,100,28]</a:t>
+                      </a:r>
+                      <a:endParaRPr lang="zh-TW" altLang="en-US" dirty="0"/>
+                    </a:p>
+                  </a:txBody>
+                  <a:tcPr/>
+                </a:tc>
+                <a:tc>
+                  <a:txBody>
+                    <a:bodyPr/>
+                    <a:lstStyle/>
+                    <a:p>
+                      <a:pPr algn="ctr"/>
+                      <a:r>
+                        <a:rPr lang="en-US" altLang="zh-TW" dirty="0" smtClean="0"/>
+                        <a:t>X</a:t>
+                      </a:r>
+                      <a:endParaRPr lang="zh-TW" altLang="en-US" dirty="0"/>
+                    </a:p>
+                  </a:txBody>
+                  <a:tcPr/>
+                </a:tc>
+                <a:tc>
+                  <a:txBody>
+                    <a:bodyPr/>
+                    <a:lstStyle/>
+                    <a:p>
+                      <a:pPr algn="ctr"/>
+                      <a:r>
+                        <a:rPr lang="en-US" altLang="zh-TW" dirty="0" smtClean="0"/>
+                        <a:t>[39,73,8]</a:t>
+                      </a:r>
+                      <a:endParaRPr lang="zh-TW" altLang="en-US" dirty="0"/>
+                    </a:p>
+                  </a:txBody>
+                  <a:tcPr/>
+                </a:tc>
+                <a:extLst>
+                  <a:ext uri="{0D108BD9-81ED-4DB2-BD59-A6C34878D82A}">
+                    <a16:rowId xmlns:a16="http://schemas.microsoft.com/office/drawing/2014/main" val="4207554321"/>
+                  </a:ext>
+                </a:extLst>
+              </a:tr>
+            </a:tbl>
+          </a:graphicData>
+        </a:graphic>
+      </p:graphicFrame>
+    </p:spTree>
+    <p:extLst>
+      <p:ext uri="{BB962C8B-B14F-4D97-AF65-F5344CB8AC3E}">
+        <p14:creationId xmlns:p14="http://schemas.microsoft.com/office/powerpoint/2010/main" val="3970246649"/>
+      </p:ext>
+    </p:extLst>
+  </p:cSld>
+  <p:clrMapOvr>
+    <a:masterClrMapping/>
+  </p:clrMapOvr>
+</p:sld>
+</file>
+
+<file path=ppt/slides/slide25.xml><?xml version="1.0" encoding="utf-8"?>
+<p:sld xmlns:a="http://schemas.openxmlformats.org/drawingml/2006/main" xmlns:r="http://schemas.openxmlformats.org/officeDocument/2006/relationships" xmlns:p="http://schemas.openxmlformats.org/presentationml/2006/main">
+  <p:cSld>
+    <p:spTree>
+      <p:nvGrpSpPr>
+        <p:cNvPr id="1" name=""/>
+        <p:cNvGrpSpPr/>
+        <p:nvPr/>
+      </p:nvGrpSpPr>
+      <p:grpSpPr>
+        <a:xfrm>
+          <a:off x="0" y="0"/>
+          <a:ext cx="0" cy="0"/>
+          <a:chOff x="0" y="0"/>
+          <a:chExt cx="0" cy="0"/>
+        </a:xfrm>
+      </p:grpSpPr>
+      <p:sp>
+        <p:nvSpPr>
+          <p:cNvPr id="2" name="標題 1"/>
+          <p:cNvSpPr>
+            <a:spLocks noGrp="1"/>
+          </p:cNvSpPr>
+          <p:nvPr>
+            <p:ph type="title"/>
+          </p:nvPr>
+        </p:nvSpPr>
+        <p:spPr>
+          <a:xfrm>
+            <a:off x="685800" y="780998"/>
+            <a:ext cx="10820400" cy="1293028"/>
+          </a:xfrm>
+        </p:spPr>
+        <p:txBody>
+          <a:bodyPr/>
+          <a:lstStyle/>
+          <a:p>
+            <a:pPr algn="l"/>
+            <a:r>
+              <a:rPr lang="en-US" altLang="zh-TW" dirty="0"/>
+              <a:t>Conclusion</a:t>
+            </a:r>
+            <a:r>
+              <a:rPr lang="zh-TW" altLang="en-US" dirty="0"/>
+              <a:t> </a:t>
+            </a:r>
+            <a:r>
+              <a:rPr lang="en-US" altLang="zh-TW" dirty="0"/>
+              <a:t>&amp;</a:t>
+            </a:r>
+            <a:r>
+              <a:rPr lang="zh-TW" altLang="en-US" dirty="0"/>
+              <a:t> </a:t>
+            </a:r>
+            <a:r>
+              <a:rPr lang="en-US" altLang="zh-TW" dirty="0"/>
+              <a:t>observation</a:t>
+            </a:r>
+            <a:endParaRPr lang="zh-TW" altLang="en-US" dirty="0"/>
+          </a:p>
+        </p:txBody>
+      </p:sp>
+      <p:sp>
+        <p:nvSpPr>
+          <p:cNvPr id="3" name="內容版面配置區 2"/>
+          <p:cNvSpPr>
+            <a:spLocks noGrp="1"/>
+          </p:cNvSpPr>
+          <p:nvPr>
+            <p:ph idx="1"/>
+          </p:nvPr>
+        </p:nvSpPr>
+        <p:spPr>
+          <a:xfrm>
+            <a:off x="685800" y="2194560"/>
+            <a:ext cx="10820400" cy="4024125"/>
+          </a:xfrm>
+        </p:spPr>
+        <p:txBody>
+          <a:bodyPr>
+            <a:normAutofit/>
+          </a:bodyPr>
+          <a:lstStyle/>
+          <a:p>
+            <a:r>
+              <a:rPr lang="zh-TW" altLang="en-US" dirty="0" smtClean="0"/>
+              <a:t>另外我們發現到以</a:t>
+            </a:r>
+            <a:r>
+              <a:rPr lang="en-US" altLang="zh-TW" dirty="0" smtClean="0"/>
+              <a:t>Hash-Tree</a:t>
+            </a:r>
+            <a:r>
+              <a:rPr lang="zh-TW" altLang="en-US" dirty="0" smtClean="0"/>
+              <a:t> 實作</a:t>
+            </a:r>
+            <a:r>
+              <a:rPr lang="en-US" altLang="zh-TW" dirty="0" err="1" smtClean="0"/>
+              <a:t>Apriori</a:t>
+            </a:r>
+            <a:r>
+              <a:rPr lang="zh-TW" altLang="en-US" dirty="0" smtClean="0"/>
+              <a:t>的算法，它的</a:t>
+            </a:r>
+            <a:r>
+              <a:rPr lang="en-US" altLang="zh-TW" dirty="0" err="1" smtClean="0"/>
+              <a:t>max_leaf_count</a:t>
+            </a:r>
+            <a:r>
+              <a:rPr lang="zh-TW" altLang="en-US" dirty="0" smtClean="0"/>
+              <a:t>與</a:t>
+            </a:r>
+            <a:r>
+              <a:rPr lang="en-US" altLang="zh-TW" dirty="0" err="1" smtClean="0"/>
+              <a:t>max_child_count</a:t>
+            </a:r>
+            <a:r>
+              <a:rPr lang="zh-TW" altLang="en-US" dirty="0" smtClean="0"/>
+              <a:t>似</a:t>
+            </a:r>
+            <a:r>
+              <a:rPr lang="zh-TW" altLang="en-US" dirty="0"/>
+              <a:t>乎</a:t>
+            </a:r>
+            <a:r>
+              <a:rPr lang="zh-TW" altLang="en-US" dirty="0" smtClean="0"/>
+              <a:t>不太會去影響它的最終結果</a:t>
+            </a:r>
+            <a:endParaRPr lang="en-US" altLang="zh-TW" dirty="0"/>
+          </a:p>
+          <a:p>
+            <a:pPr marL="0" indent="0" algn="ctr">
+              <a:buNone/>
+            </a:pPr>
+            <a:r>
+              <a:rPr lang="zh-TW" altLang="en-US" dirty="0"/>
+              <a:t>以</a:t>
+            </a:r>
+            <a:r>
+              <a:rPr lang="en-US" altLang="zh-TW" dirty="0"/>
+              <a:t>IBM</a:t>
+            </a:r>
+            <a:r>
+              <a:rPr lang="zh-TW" altLang="en-US" dirty="0"/>
+              <a:t>的</a:t>
+            </a:r>
+            <a:r>
+              <a:rPr lang="en-US" altLang="zh-TW" dirty="0"/>
+              <a:t>Data</a:t>
+            </a:r>
+            <a:r>
+              <a:rPr lang="zh-TW" altLang="en-US" dirty="0"/>
+              <a:t>為目標</a:t>
+            </a:r>
+            <a:r>
+              <a:rPr lang="zh-TW" altLang="en-US" dirty="0" smtClean="0"/>
+              <a:t>分析</a:t>
+            </a:r>
+            <a:r>
+              <a:rPr lang="en-US" altLang="zh-TW" dirty="0" err="1"/>
+              <a:t>max_leaf_count</a:t>
+            </a:r>
+            <a:r>
+              <a:rPr lang="zh-TW" altLang="en-US" dirty="0" smtClean="0"/>
+              <a:t>的影響</a:t>
+            </a:r>
+            <a:endParaRPr lang="en-US" altLang="zh-TW" dirty="0"/>
+          </a:p>
+          <a:p>
+            <a:endParaRPr lang="en-US" altLang="zh-TW" dirty="0" smtClean="0"/>
+          </a:p>
+          <a:p>
+            <a:endParaRPr lang="en-US" altLang="zh-TW" dirty="0" smtClean="0"/>
+          </a:p>
+          <a:p>
+            <a:endParaRPr lang="en-US" altLang="zh-TW" dirty="0" smtClean="0"/>
+          </a:p>
+          <a:p>
+            <a:pPr marL="0" indent="0" algn="ctr">
+              <a:buNone/>
+            </a:pPr>
+            <a:r>
+              <a:rPr lang="zh-TW" altLang="en-US" dirty="0"/>
+              <a:t>以</a:t>
+            </a:r>
+            <a:r>
+              <a:rPr lang="en-US" altLang="zh-TW" dirty="0"/>
+              <a:t>IBM</a:t>
+            </a:r>
+            <a:r>
+              <a:rPr lang="zh-TW" altLang="en-US" dirty="0"/>
+              <a:t>的</a:t>
+            </a:r>
+            <a:r>
+              <a:rPr lang="en-US" altLang="zh-TW" dirty="0"/>
+              <a:t>Data</a:t>
+            </a:r>
+            <a:r>
+              <a:rPr lang="zh-TW" altLang="en-US" dirty="0"/>
+              <a:t>為目標</a:t>
+            </a:r>
+            <a:r>
+              <a:rPr lang="zh-TW" altLang="en-US" dirty="0" smtClean="0"/>
+              <a:t>分析</a:t>
+            </a:r>
+            <a:r>
+              <a:rPr lang="en-US" altLang="zh-TW" dirty="0" err="1"/>
+              <a:t>max_child_count</a:t>
+            </a:r>
+            <a:r>
+              <a:rPr lang="zh-TW" altLang="en-US" dirty="0" smtClean="0"/>
+              <a:t>的</a:t>
+            </a:r>
+            <a:r>
+              <a:rPr lang="zh-TW" altLang="en-US" dirty="0"/>
+              <a:t>影響</a:t>
+            </a:r>
+            <a:endParaRPr lang="en-US" altLang="zh-TW" dirty="0"/>
+          </a:p>
+          <a:p>
+            <a:endParaRPr lang="en-US" altLang="zh-TW" dirty="0"/>
+          </a:p>
+        </p:txBody>
+      </p:sp>
+      <p:graphicFrame>
+        <p:nvGraphicFramePr>
+          <p:cNvPr id="4" name="表格 3"/>
+          <p:cNvGraphicFramePr>
+            <a:graphicFrameLocks noGrp="1"/>
+          </p:cNvGraphicFramePr>
+          <p:nvPr>
+            <p:extLst>
+              <p:ext uri="{D42A27DB-BD31-4B8C-83A1-F6EECF244321}">
+                <p14:modId xmlns:p14="http://schemas.microsoft.com/office/powerpoint/2010/main" val="3745081038"/>
+              </p:ext>
+            </p:extLst>
+          </p:nvPr>
+        </p:nvGraphicFramePr>
+        <p:xfrm>
+          <a:off x="1172095" y="3421302"/>
+          <a:ext cx="8853052" cy="1010920"/>
+        </p:xfrm>
+        <a:graphic>
+          <a:graphicData uri="http://schemas.openxmlformats.org/drawingml/2006/table">
+            <a:tbl>
+              <a:tblPr firstRow="1" bandRow="1">
+                <a:tableStyleId>{5C22544A-7EE6-4342-B048-85BDC9FD1C3A}</a:tableStyleId>
+              </a:tblPr>
+              <a:tblGrid>
+                <a:gridCol w="2213263">
+                  <a:extLst>
+                    <a:ext uri="{9D8B030D-6E8A-4147-A177-3AD203B41FA5}">
+                      <a16:colId xmlns:a16="http://schemas.microsoft.com/office/drawing/2014/main" val="3606595524"/>
+                    </a:ext>
+                  </a:extLst>
+                </a:gridCol>
+                <a:gridCol w="2213263">
+                  <a:extLst>
+                    <a:ext uri="{9D8B030D-6E8A-4147-A177-3AD203B41FA5}">
+                      <a16:colId xmlns:a16="http://schemas.microsoft.com/office/drawing/2014/main" val="3155920357"/>
+                    </a:ext>
+                  </a:extLst>
+                </a:gridCol>
+                <a:gridCol w="2213263">
+                  <a:extLst>
+                    <a:ext uri="{9D8B030D-6E8A-4147-A177-3AD203B41FA5}">
+                      <a16:colId xmlns:a16="http://schemas.microsoft.com/office/drawing/2014/main" val="1799064945"/>
+                    </a:ext>
+                  </a:extLst>
+                </a:gridCol>
+                <a:gridCol w="2213263">
+                  <a:extLst>
+                    <a:ext uri="{9D8B030D-6E8A-4147-A177-3AD203B41FA5}">
+                      <a16:colId xmlns:a16="http://schemas.microsoft.com/office/drawing/2014/main" val="1195422261"/>
+                    </a:ext>
+                  </a:extLst>
+                </a:gridCol>
+              </a:tblGrid>
+              <a:tr h="370840">
+                <a:tc>
+                  <a:txBody>
+                    <a:bodyPr/>
+                    <a:lstStyle/>
+                    <a:p>
+                      <a:pPr algn="ctr"/>
+                      <a:endParaRPr lang="zh-TW" altLang="en-US" dirty="0"/>
+                    </a:p>
+                  </a:txBody>
+                  <a:tcPr/>
+                </a:tc>
+                <a:tc>
+                  <a:txBody>
+                    <a:bodyPr/>
+                    <a:lstStyle/>
+                    <a:p>
+                      <a:pPr algn="ctr"/>
+                      <a:r>
+                        <a:rPr lang="en-US" altLang="zh-TW" dirty="0" err="1" smtClean="0"/>
+                        <a:t>max_leaf_count</a:t>
+                      </a:r>
+                      <a:r>
+                        <a:rPr lang="zh-TW" altLang="en-US" dirty="0" smtClean="0"/>
+                        <a:t> </a:t>
+                      </a:r>
+                      <a:r>
+                        <a:rPr lang="en-US" altLang="zh-TW" dirty="0" smtClean="0"/>
+                        <a:t>=</a:t>
+                      </a:r>
+                      <a:r>
+                        <a:rPr lang="zh-TW" altLang="en-US" dirty="0" smtClean="0"/>
+                        <a:t> </a:t>
+                      </a:r>
+                      <a:endParaRPr lang="en-US" altLang="zh-TW" dirty="0" smtClean="0"/>
+                    </a:p>
+                    <a:p>
+                      <a:pPr algn="ctr"/>
+                      <a:r>
+                        <a:rPr lang="en-US" altLang="zh-TW" dirty="0" smtClean="0"/>
+                        <a:t>3</a:t>
+                      </a:r>
+                      <a:endParaRPr lang="zh-TW" altLang="en-US" dirty="0"/>
+                    </a:p>
+                  </a:txBody>
+                  <a:tcPr/>
+                </a:tc>
+                <a:tc>
+                  <a:txBody>
+                    <a:bodyPr/>
+                    <a:lstStyle/>
+                    <a:p>
+                      <a:pPr marL="0" marR="0" indent="0" algn="ctr" defTabSz="914400" rtl="0" eaLnBrk="1" fontAlgn="auto" latinLnBrk="0" hangingPunct="1">
+                        <a:lnSpc>
+                          <a:spcPct val="100000"/>
+                        </a:lnSpc>
+                        <a:spcBef>
+                          <a:spcPts val="0"/>
+                        </a:spcBef>
+                        <a:spcAft>
+                          <a:spcPts val="0"/>
+                        </a:spcAft>
+                        <a:buClrTx/>
+                        <a:buSzTx/>
+                        <a:buFontTx/>
+                        <a:buNone/>
+                        <a:tabLst/>
+                        <a:defRPr/>
+                      </a:pPr>
+                      <a:r>
+                        <a:rPr lang="en-US" altLang="zh-TW" dirty="0" err="1" smtClean="0"/>
+                        <a:t>max_leaf_count</a:t>
+                      </a:r>
+                      <a:r>
+                        <a:rPr lang="zh-TW" altLang="en-US" dirty="0" smtClean="0"/>
+                        <a:t> </a:t>
+                      </a:r>
+                      <a:r>
+                        <a:rPr lang="en-US" altLang="zh-TW" dirty="0" smtClean="0"/>
+                        <a:t>=</a:t>
+                      </a:r>
+                      <a:r>
+                        <a:rPr lang="zh-TW" altLang="en-US" dirty="0" smtClean="0"/>
+                        <a:t> </a:t>
+                      </a:r>
+                    </a:p>
+                    <a:p>
+                      <a:pPr algn="ctr"/>
+                      <a:r>
+                        <a:rPr lang="en-US" altLang="zh-TW" dirty="0" smtClean="0"/>
+                        <a:t>10</a:t>
+                      </a:r>
+                      <a:endParaRPr lang="zh-TW" altLang="en-US" dirty="0"/>
+                    </a:p>
+                  </a:txBody>
+                  <a:tcPr/>
+                </a:tc>
+                <a:tc>
+                  <a:txBody>
+                    <a:bodyPr/>
+                    <a:lstStyle/>
+                    <a:p>
+                      <a:pPr marL="0" marR="0" indent="0" algn="ctr" defTabSz="914400" rtl="0" eaLnBrk="1" fontAlgn="auto" latinLnBrk="0" hangingPunct="1">
+                        <a:lnSpc>
+                          <a:spcPct val="100000"/>
+                        </a:lnSpc>
+                        <a:spcBef>
+                          <a:spcPts val="0"/>
+                        </a:spcBef>
+                        <a:spcAft>
+                          <a:spcPts val="0"/>
+                        </a:spcAft>
+                        <a:buClrTx/>
+                        <a:buSzTx/>
+                        <a:buFontTx/>
+                        <a:buNone/>
+                        <a:tabLst/>
+                        <a:defRPr/>
+                      </a:pPr>
+                      <a:r>
+                        <a:rPr lang="en-US" altLang="zh-TW" dirty="0" err="1" smtClean="0"/>
+                        <a:t>max_leaf_count</a:t>
+                      </a:r>
+                      <a:r>
+                        <a:rPr lang="zh-TW" altLang="en-US" dirty="0" smtClean="0"/>
+                        <a:t> </a:t>
+                      </a:r>
+                      <a:r>
+                        <a:rPr lang="en-US" altLang="zh-TW" dirty="0" smtClean="0"/>
+                        <a:t>=</a:t>
+                      </a:r>
+                      <a:r>
+                        <a:rPr lang="zh-TW" altLang="en-US" dirty="0" smtClean="0"/>
+                        <a:t> </a:t>
+                      </a:r>
+                    </a:p>
+                    <a:p>
+                      <a:pPr algn="ctr"/>
+                      <a:r>
+                        <a:rPr lang="en-US" altLang="zh-TW" dirty="0" smtClean="0"/>
+                        <a:t>20</a:t>
+                      </a:r>
+                      <a:endParaRPr lang="zh-TW" altLang="en-US" dirty="0"/>
+                    </a:p>
+                  </a:txBody>
+                  <a:tcPr/>
+                </a:tc>
+                <a:extLst>
+                  <a:ext uri="{0D108BD9-81ED-4DB2-BD59-A6C34878D82A}">
+                    <a16:rowId xmlns:a16="http://schemas.microsoft.com/office/drawing/2014/main" val="476469338"/>
+                  </a:ext>
+                </a:extLst>
+              </a:tr>
+              <a:tr h="370840">
+                <a:tc>
+                  <a:txBody>
+                    <a:bodyPr/>
+                    <a:lstStyle/>
+                    <a:p>
+                      <a:pPr marL="0" marR="0" indent="0" algn="ctr" defTabSz="914400" rtl="0" eaLnBrk="1" fontAlgn="auto" latinLnBrk="0" hangingPunct="1">
+                        <a:lnSpc>
+                          <a:spcPct val="100000"/>
+                        </a:lnSpc>
+                        <a:spcBef>
+                          <a:spcPts val="0"/>
+                        </a:spcBef>
+                        <a:spcAft>
+                          <a:spcPts val="0"/>
+                        </a:spcAft>
+                        <a:buClrTx/>
+                        <a:buSzTx/>
+                        <a:buFontTx/>
+                        <a:buNone/>
+                        <a:tabLst/>
+                        <a:defRPr/>
+                      </a:pPr>
+                      <a:r>
+                        <a:rPr lang="en-US" altLang="zh-TW" dirty="0" smtClean="0"/>
+                        <a:t>Hash-Tree</a:t>
+                      </a:r>
+                      <a:endParaRPr lang="zh-TW" altLang="en-US" dirty="0" smtClean="0"/>
+                    </a:p>
+                  </a:txBody>
+                  <a:tcPr/>
+                </a:tc>
+                <a:tc>
+                  <a:txBody>
+                    <a:bodyPr/>
+                    <a:lstStyle/>
+                    <a:p>
+                      <a:pPr marL="0" marR="0" indent="0" algn="ctr" defTabSz="914400" rtl="0" eaLnBrk="1" fontAlgn="auto" latinLnBrk="0" hangingPunct="1">
+                        <a:lnSpc>
+                          <a:spcPct val="100000"/>
+                        </a:lnSpc>
+                        <a:spcBef>
+                          <a:spcPts val="0"/>
+                        </a:spcBef>
+                        <a:spcAft>
+                          <a:spcPts val="0"/>
+                        </a:spcAft>
+                        <a:buClrTx/>
+                        <a:buSzTx/>
+                        <a:buFontTx/>
+                        <a:buNone/>
+                        <a:tabLst/>
+                        <a:defRPr/>
+                      </a:pPr>
+                      <a:r>
+                        <a:rPr lang="en-US" altLang="zh-TW" dirty="0" smtClean="0"/>
+                        <a:t>[35,11,5,1]</a:t>
+                      </a:r>
+                      <a:endParaRPr lang="zh-TW" altLang="en-US" dirty="0" smtClean="0"/>
+                    </a:p>
+                  </a:txBody>
+                  <a:tcPr/>
+                </a:tc>
+                <a:tc>
+                  <a:txBody>
+                    <a:bodyPr/>
+                    <a:lstStyle/>
+                    <a:p>
+                      <a:pPr marL="0" marR="0" indent="0" algn="ctr" defTabSz="914400" rtl="0" eaLnBrk="1" fontAlgn="auto" latinLnBrk="0" hangingPunct="1">
+                        <a:lnSpc>
+                          <a:spcPct val="100000"/>
+                        </a:lnSpc>
+                        <a:spcBef>
+                          <a:spcPts val="0"/>
+                        </a:spcBef>
+                        <a:spcAft>
+                          <a:spcPts val="0"/>
+                        </a:spcAft>
+                        <a:buClrTx/>
+                        <a:buSzTx/>
+                        <a:buFontTx/>
+                        <a:buNone/>
+                        <a:tabLst/>
+                        <a:defRPr/>
+                      </a:pPr>
+                      <a:r>
+                        <a:rPr lang="en-US" altLang="zh-TW" dirty="0" smtClean="0"/>
+                        <a:t>[35,11,5,1]</a:t>
+                      </a:r>
+                      <a:endParaRPr lang="zh-TW" altLang="en-US" dirty="0" smtClean="0"/>
+                    </a:p>
+                  </a:txBody>
+                  <a:tcPr/>
+                </a:tc>
+                <a:tc>
+                  <a:txBody>
+                    <a:bodyPr/>
+                    <a:lstStyle/>
+                    <a:p>
+                      <a:pPr marL="0" marR="0" indent="0" algn="ctr" defTabSz="914400" rtl="0" eaLnBrk="1" fontAlgn="auto" latinLnBrk="0" hangingPunct="1">
+                        <a:lnSpc>
+                          <a:spcPct val="100000"/>
+                        </a:lnSpc>
+                        <a:spcBef>
+                          <a:spcPts val="0"/>
+                        </a:spcBef>
+                        <a:spcAft>
+                          <a:spcPts val="0"/>
+                        </a:spcAft>
+                        <a:buClrTx/>
+                        <a:buSzTx/>
+                        <a:buFontTx/>
+                        <a:buNone/>
+                        <a:tabLst/>
+                        <a:defRPr/>
+                      </a:pPr>
+                      <a:r>
+                        <a:rPr lang="en-US" altLang="zh-TW" dirty="0" smtClean="0"/>
+                        <a:t>[35,11,5,1]</a:t>
+                      </a:r>
+                      <a:endParaRPr lang="zh-TW" altLang="en-US" dirty="0" smtClean="0"/>
+                    </a:p>
+                  </a:txBody>
+                  <a:tcPr/>
+                </a:tc>
+                <a:extLst>
+                  <a:ext uri="{0D108BD9-81ED-4DB2-BD59-A6C34878D82A}">
+                    <a16:rowId xmlns:a16="http://schemas.microsoft.com/office/drawing/2014/main" val="3786179521"/>
+                  </a:ext>
+                </a:extLst>
+              </a:tr>
+            </a:tbl>
+          </a:graphicData>
+        </a:graphic>
+      </p:graphicFrame>
+      <p:graphicFrame>
+        <p:nvGraphicFramePr>
+          <p:cNvPr id="8" name="表格 7"/>
+          <p:cNvGraphicFramePr>
+            <a:graphicFrameLocks noGrp="1"/>
+          </p:cNvGraphicFramePr>
+          <p:nvPr>
+            <p:extLst>
+              <p:ext uri="{D42A27DB-BD31-4B8C-83A1-F6EECF244321}">
+                <p14:modId xmlns:p14="http://schemas.microsoft.com/office/powerpoint/2010/main" val="1364292714"/>
+              </p:ext>
+            </p:extLst>
+          </p:nvPr>
+        </p:nvGraphicFramePr>
+        <p:xfrm>
+          <a:off x="1172095" y="5134647"/>
+          <a:ext cx="9725892" cy="1010920"/>
+        </p:xfrm>
+        <a:graphic>
+          <a:graphicData uri="http://schemas.openxmlformats.org/drawingml/2006/table">
+            <a:tbl>
+              <a:tblPr firstRow="1" bandRow="1">
+                <a:tableStyleId>{5C22544A-7EE6-4342-B048-85BDC9FD1C3A}</a:tableStyleId>
+              </a:tblPr>
+              <a:tblGrid>
+                <a:gridCol w="2431473">
+                  <a:extLst>
+                    <a:ext uri="{9D8B030D-6E8A-4147-A177-3AD203B41FA5}">
+                      <a16:colId xmlns:a16="http://schemas.microsoft.com/office/drawing/2014/main" val="3606595524"/>
+                    </a:ext>
+                  </a:extLst>
+                </a:gridCol>
+                <a:gridCol w="2431473">
+                  <a:extLst>
+                    <a:ext uri="{9D8B030D-6E8A-4147-A177-3AD203B41FA5}">
+                      <a16:colId xmlns:a16="http://schemas.microsoft.com/office/drawing/2014/main" val="3155920357"/>
+                    </a:ext>
+                  </a:extLst>
+                </a:gridCol>
+                <a:gridCol w="2431473">
+                  <a:extLst>
+                    <a:ext uri="{9D8B030D-6E8A-4147-A177-3AD203B41FA5}">
+                      <a16:colId xmlns:a16="http://schemas.microsoft.com/office/drawing/2014/main" val="1799064945"/>
+                    </a:ext>
+                  </a:extLst>
+                </a:gridCol>
+                <a:gridCol w="2431473">
+                  <a:extLst>
+                    <a:ext uri="{9D8B030D-6E8A-4147-A177-3AD203B41FA5}">
+                      <a16:colId xmlns:a16="http://schemas.microsoft.com/office/drawing/2014/main" val="1195422261"/>
+                    </a:ext>
+                  </a:extLst>
+                </a:gridCol>
+              </a:tblGrid>
+              <a:tr h="370840">
+                <a:tc>
+                  <a:txBody>
+                    <a:bodyPr/>
+                    <a:lstStyle/>
+                    <a:p>
+                      <a:pPr algn="ctr"/>
+                      <a:endParaRPr lang="zh-TW" altLang="en-US" dirty="0"/>
+                    </a:p>
+                  </a:txBody>
+                  <a:tcPr/>
+                </a:tc>
+                <a:tc>
+                  <a:txBody>
+                    <a:bodyPr/>
+                    <a:lstStyle/>
+                    <a:p>
+                      <a:pPr algn="ctr"/>
+                      <a:r>
+                        <a:rPr lang="en-US" altLang="zh-TW" dirty="0" err="1" smtClean="0"/>
+                        <a:t>max_child_count</a:t>
+                      </a:r>
+                      <a:r>
+                        <a:rPr lang="zh-TW" altLang="en-US" dirty="0" smtClean="0"/>
+                        <a:t> </a:t>
+                      </a:r>
+                      <a:r>
+                        <a:rPr lang="en-US" altLang="zh-TW" dirty="0" smtClean="0"/>
+                        <a:t>=</a:t>
+                      </a:r>
+                      <a:r>
+                        <a:rPr lang="zh-TW" altLang="en-US" dirty="0" smtClean="0"/>
+                        <a:t> </a:t>
+                      </a:r>
+                      <a:endParaRPr lang="en-US" altLang="zh-TW" dirty="0" smtClean="0"/>
+                    </a:p>
+                    <a:p>
+                      <a:pPr algn="ctr"/>
+                      <a:r>
+                        <a:rPr lang="en-US" altLang="zh-TW" dirty="0" smtClean="0"/>
+                        <a:t>5</a:t>
+                      </a:r>
+                      <a:endParaRPr lang="zh-TW" altLang="en-US" dirty="0"/>
+                    </a:p>
+                  </a:txBody>
+                  <a:tcPr/>
+                </a:tc>
+                <a:tc>
+                  <a:txBody>
+                    <a:bodyPr/>
+                    <a:lstStyle/>
+                    <a:p>
+                      <a:pPr marL="0" marR="0" indent="0" algn="ctr" defTabSz="914400" rtl="0" eaLnBrk="1" fontAlgn="auto" latinLnBrk="0" hangingPunct="1">
+                        <a:lnSpc>
+                          <a:spcPct val="100000"/>
+                        </a:lnSpc>
+                        <a:spcBef>
+                          <a:spcPts val="0"/>
+                        </a:spcBef>
+                        <a:spcAft>
+                          <a:spcPts val="0"/>
+                        </a:spcAft>
+                        <a:buClrTx/>
+                        <a:buSzTx/>
+                        <a:buFontTx/>
+                        <a:buNone/>
+                        <a:tabLst/>
+                        <a:defRPr/>
+                      </a:pPr>
+                      <a:r>
+                        <a:rPr lang="en-US" altLang="zh-TW" dirty="0" err="1" smtClean="0"/>
+                        <a:t>max_child_count</a:t>
+                      </a:r>
+                      <a:r>
+                        <a:rPr lang="zh-TW" altLang="en-US" dirty="0" smtClean="0"/>
+                        <a:t> </a:t>
+                      </a:r>
+                      <a:r>
+                        <a:rPr lang="en-US" altLang="zh-TW" dirty="0" smtClean="0"/>
+                        <a:t>=</a:t>
+                      </a:r>
+                      <a:r>
+                        <a:rPr lang="zh-TW" altLang="en-US" dirty="0" smtClean="0"/>
+                        <a:t> </a:t>
+                      </a:r>
+                    </a:p>
+                    <a:p>
+                      <a:pPr algn="ctr"/>
+                      <a:r>
+                        <a:rPr lang="en-US" altLang="zh-TW" dirty="0" smtClean="0"/>
+                        <a:t>10</a:t>
+                      </a:r>
+                      <a:endParaRPr lang="zh-TW" altLang="en-US" dirty="0"/>
+                    </a:p>
+                  </a:txBody>
+                  <a:tcPr/>
+                </a:tc>
+                <a:tc>
+                  <a:txBody>
+                    <a:bodyPr/>
+                    <a:lstStyle/>
+                    <a:p>
+                      <a:pPr marL="0" marR="0" indent="0" algn="ctr" defTabSz="914400" rtl="0" eaLnBrk="1" fontAlgn="auto" latinLnBrk="0" hangingPunct="1">
+                        <a:lnSpc>
+                          <a:spcPct val="100000"/>
+                        </a:lnSpc>
+                        <a:spcBef>
+                          <a:spcPts val="0"/>
+                        </a:spcBef>
+                        <a:spcAft>
+                          <a:spcPts val="0"/>
+                        </a:spcAft>
+                        <a:buClrTx/>
+                        <a:buSzTx/>
+                        <a:buFontTx/>
+                        <a:buNone/>
+                        <a:tabLst/>
+                        <a:defRPr/>
+                      </a:pPr>
+                      <a:r>
+                        <a:rPr lang="en-US" altLang="zh-TW" dirty="0" err="1" smtClean="0"/>
+                        <a:t>max_child_count</a:t>
+                      </a:r>
+                      <a:r>
+                        <a:rPr lang="zh-TW" altLang="en-US" dirty="0" smtClean="0"/>
+                        <a:t> </a:t>
+                      </a:r>
+                      <a:r>
+                        <a:rPr lang="en-US" altLang="zh-TW" dirty="0" smtClean="0"/>
+                        <a:t>=</a:t>
+                      </a:r>
+                      <a:r>
+                        <a:rPr lang="zh-TW" altLang="en-US" dirty="0" smtClean="0"/>
+                        <a:t> </a:t>
+                      </a:r>
+                    </a:p>
+                    <a:p>
+                      <a:pPr algn="ctr"/>
+                      <a:r>
+                        <a:rPr lang="en-US" altLang="zh-TW" dirty="0" smtClean="0"/>
+                        <a:t>20</a:t>
+                      </a:r>
+                      <a:endParaRPr lang="zh-TW" altLang="en-US" dirty="0"/>
+                    </a:p>
+                  </a:txBody>
+                  <a:tcPr/>
+                </a:tc>
+                <a:extLst>
+                  <a:ext uri="{0D108BD9-81ED-4DB2-BD59-A6C34878D82A}">
+                    <a16:rowId xmlns:a16="http://schemas.microsoft.com/office/drawing/2014/main" val="476469338"/>
+                  </a:ext>
+                </a:extLst>
+              </a:tr>
+              <a:tr h="370840">
+                <a:tc>
+                  <a:txBody>
+                    <a:bodyPr/>
+                    <a:lstStyle/>
+                    <a:p>
+                      <a:pPr marL="0" marR="0" indent="0" algn="ctr" defTabSz="914400" rtl="0" eaLnBrk="1" fontAlgn="auto" latinLnBrk="0" hangingPunct="1">
+                        <a:lnSpc>
+                          <a:spcPct val="100000"/>
+                        </a:lnSpc>
+                        <a:spcBef>
+                          <a:spcPts val="0"/>
+                        </a:spcBef>
+                        <a:spcAft>
+                          <a:spcPts val="0"/>
+                        </a:spcAft>
+                        <a:buClrTx/>
+                        <a:buSzTx/>
+                        <a:buFontTx/>
+                        <a:buNone/>
+                        <a:tabLst/>
+                        <a:defRPr/>
+                      </a:pPr>
+                      <a:r>
+                        <a:rPr lang="en-US" altLang="zh-TW" dirty="0" smtClean="0"/>
+                        <a:t>Hash-Tree</a:t>
+                      </a:r>
+                      <a:endParaRPr lang="zh-TW" altLang="en-US" dirty="0" smtClean="0"/>
+                    </a:p>
+                  </a:txBody>
+                  <a:tcPr/>
+                </a:tc>
+                <a:tc>
+                  <a:txBody>
+                    <a:bodyPr/>
+                    <a:lstStyle/>
+                    <a:p>
+                      <a:pPr marL="0" marR="0" indent="0" algn="ctr" defTabSz="914400" rtl="0" eaLnBrk="1" fontAlgn="auto" latinLnBrk="0" hangingPunct="1">
+                        <a:lnSpc>
+                          <a:spcPct val="100000"/>
+                        </a:lnSpc>
+                        <a:spcBef>
+                          <a:spcPts val="0"/>
+                        </a:spcBef>
+                        <a:spcAft>
+                          <a:spcPts val="0"/>
+                        </a:spcAft>
+                        <a:buClrTx/>
+                        <a:buSzTx/>
+                        <a:buFontTx/>
+                        <a:buNone/>
+                        <a:tabLst/>
+                        <a:defRPr/>
+                      </a:pPr>
+                      <a:r>
+                        <a:rPr lang="en-US" altLang="zh-TW" dirty="0" smtClean="0"/>
+                        <a:t>[35,11,5,1]</a:t>
+                      </a:r>
+                      <a:endParaRPr lang="zh-TW" altLang="en-US" dirty="0" smtClean="0"/>
+                    </a:p>
+                  </a:txBody>
+                  <a:tcPr/>
+                </a:tc>
+                <a:tc>
+                  <a:txBody>
+                    <a:bodyPr/>
+                    <a:lstStyle/>
+                    <a:p>
+                      <a:pPr marL="0" marR="0" indent="0" algn="ctr" defTabSz="914400" rtl="0" eaLnBrk="1" fontAlgn="auto" latinLnBrk="0" hangingPunct="1">
+                        <a:lnSpc>
+                          <a:spcPct val="100000"/>
+                        </a:lnSpc>
+                        <a:spcBef>
+                          <a:spcPts val="0"/>
+                        </a:spcBef>
+                        <a:spcAft>
+                          <a:spcPts val="0"/>
+                        </a:spcAft>
+                        <a:buClrTx/>
+                        <a:buSzTx/>
+                        <a:buFontTx/>
+                        <a:buNone/>
+                        <a:tabLst/>
+                        <a:defRPr/>
+                      </a:pPr>
+                      <a:r>
+                        <a:rPr lang="en-US" altLang="zh-TW" dirty="0" smtClean="0"/>
+                        <a:t>[35,11,5,1]</a:t>
+                      </a:r>
+                      <a:endParaRPr lang="zh-TW" altLang="en-US" dirty="0" smtClean="0"/>
+                    </a:p>
+                  </a:txBody>
+                  <a:tcPr/>
+                </a:tc>
+                <a:tc>
+                  <a:txBody>
+                    <a:bodyPr/>
+                    <a:lstStyle/>
+                    <a:p>
+                      <a:pPr marL="0" marR="0" indent="0" algn="ctr" defTabSz="914400" rtl="0" eaLnBrk="1" fontAlgn="auto" latinLnBrk="0" hangingPunct="1">
+                        <a:lnSpc>
+                          <a:spcPct val="100000"/>
+                        </a:lnSpc>
+                        <a:spcBef>
+                          <a:spcPts val="0"/>
+                        </a:spcBef>
+                        <a:spcAft>
+                          <a:spcPts val="0"/>
+                        </a:spcAft>
+                        <a:buClrTx/>
+                        <a:buSzTx/>
+                        <a:buFontTx/>
+                        <a:buNone/>
+                        <a:tabLst/>
+                        <a:defRPr/>
+                      </a:pPr>
+                      <a:r>
+                        <a:rPr lang="en-US" altLang="zh-TW" dirty="0" smtClean="0"/>
+                        <a:t>[35,11,5,1]</a:t>
+                      </a:r>
+                      <a:endParaRPr lang="zh-TW" altLang="en-US" dirty="0" smtClean="0"/>
+                    </a:p>
+                  </a:txBody>
+                  <a:tcPr/>
+                </a:tc>
+                <a:extLst>
+                  <a:ext uri="{0D108BD9-81ED-4DB2-BD59-A6C34878D82A}">
+                    <a16:rowId xmlns:a16="http://schemas.microsoft.com/office/drawing/2014/main" val="3786179521"/>
+                  </a:ext>
+                </a:extLst>
+              </a:tr>
+            </a:tbl>
+          </a:graphicData>
+        </a:graphic>
+      </p:graphicFrame>
+    </p:spTree>
+    <p:extLst>
+      <p:ext uri="{BB962C8B-B14F-4D97-AF65-F5344CB8AC3E}">
+        <p14:creationId xmlns:p14="http://schemas.microsoft.com/office/powerpoint/2010/main" val="646676989"/>
+      </p:ext>
+    </p:extLst>
+  </p:cSld>
+  <p:clrMapOvr>
+    <a:masterClrMapping/>
+  </p:clrMapOvr>
+</p:sld>
+</file>
+
 <file path=ppt/slides/slide3.xml><?xml version="1.0" encoding="utf-8"?>
 <p:sld xmlns:a="http://schemas.openxmlformats.org/drawingml/2006/main" xmlns:r="http://schemas.openxmlformats.org/officeDocument/2006/relationships" xmlns:p="http://schemas.openxmlformats.org/presentationml/2006/main">
   <p:cSld>
@@ -9749,12 +12472,12 @@
         <p:spPr>
           <a:xfrm>
             <a:off x="685800" y="2194560"/>
-            <a:ext cx="11359342" cy="4024125"/>
+            <a:ext cx="11359342" cy="4422371"/>
           </a:xfrm>
         </p:spPr>
         <p:txBody>
           <a:bodyPr>
-            <a:normAutofit fontScale="92500" lnSpcReduction="20000"/>
+            <a:normAutofit fontScale="85000" lnSpcReduction="20000"/>
           </a:bodyPr>
           <a:lstStyle/>
           <a:p>
@@ -10067,8 +12790,100 @@
                 <a:latin typeface="Arial" panose="020B0604020202020204" pitchFamily="34" charset="0"/>
                 <a:cs typeface="Arial" panose="020B0604020202020204" pitchFamily="34" charset="0"/>
               </a:rPr>
-              <a:t>. Categorical variable with the products</a:t>
-            </a:r>
+              <a:t>. Categorical variable with the </a:t>
+            </a:r>
+            <a:r>
+              <a:rPr lang="en-US" altLang="zh-TW" dirty="0" smtClean="0">
+                <a:latin typeface="Arial" panose="020B0604020202020204" pitchFamily="34" charset="0"/>
+                <a:cs typeface="Arial" panose="020B0604020202020204" pitchFamily="34" charset="0"/>
+              </a:rPr>
+              <a:t>products</a:t>
+            </a:r>
+          </a:p>
+          <a:p>
+            <a:pPr marL="914400" lvl="2" indent="0">
+              <a:buNone/>
+            </a:pPr>
+            <a:endParaRPr lang="en-US" altLang="zh-TW" dirty="0">
+              <a:latin typeface="Arial" panose="020B0604020202020204" pitchFamily="34" charset="0"/>
+              <a:cs typeface="Arial" panose="020B0604020202020204" pitchFamily="34" charset="0"/>
+            </a:endParaRPr>
+          </a:p>
+          <a:p>
+            <a:pPr lvl="0"/>
+            <a:r>
+              <a:rPr lang="en-US" altLang="zh-TW" dirty="0" err="1" smtClean="0">
+                <a:solidFill>
+                  <a:prstClr val="black"/>
+                </a:solidFill>
+                <a:latin typeface="Arial" panose="020B0604020202020204" pitchFamily="34" charset="0"/>
+                <a:cs typeface="Arial" panose="020B0604020202020204" pitchFamily="34" charset="0"/>
+              </a:rPr>
+              <a:t>ItemSet</a:t>
+            </a:r>
+            <a:r>
+              <a:rPr lang="en-US" altLang="zh-TW" dirty="0" smtClean="0">
+                <a:solidFill>
+                  <a:prstClr val="black"/>
+                </a:solidFill>
+                <a:latin typeface="Arial" panose="020B0604020202020204" pitchFamily="34" charset="0"/>
+                <a:cs typeface="Arial" panose="020B0604020202020204" pitchFamily="34" charset="0"/>
+              </a:rPr>
+              <a:t> </a:t>
+            </a:r>
+            <a:r>
+              <a:rPr lang="en-US" altLang="zh-TW" dirty="0">
+                <a:solidFill>
+                  <a:prstClr val="black"/>
+                </a:solidFill>
+                <a:latin typeface="Arial" panose="020B0604020202020204" pitchFamily="34" charset="0"/>
+                <a:cs typeface="Arial" panose="020B0604020202020204" pitchFamily="34" charset="0"/>
+              </a:rPr>
+              <a:t>: </a:t>
+            </a:r>
+            <a:r>
+              <a:rPr lang="en-US" altLang="zh-TW" dirty="0" smtClean="0">
+                <a:solidFill>
+                  <a:prstClr val="black"/>
+                </a:solidFill>
+                <a:latin typeface="Arial" panose="020B0604020202020204" pitchFamily="34" charset="0"/>
+                <a:cs typeface="Arial" panose="020B0604020202020204" pitchFamily="34" charset="0"/>
+              </a:rPr>
+              <a:t>9683</a:t>
+            </a:r>
+            <a:r>
+              <a:rPr lang="zh-TW" altLang="en-US" dirty="0" smtClean="0">
+                <a:solidFill>
+                  <a:prstClr val="black"/>
+                </a:solidFill>
+                <a:latin typeface="Arial" panose="020B0604020202020204" pitchFamily="34" charset="0"/>
+                <a:cs typeface="Arial" panose="020B0604020202020204" pitchFamily="34" charset="0"/>
+              </a:rPr>
+              <a:t> </a:t>
+            </a:r>
+            <a:r>
+              <a:rPr lang="en-US" altLang="zh-TW" dirty="0" smtClean="0">
+                <a:solidFill>
+                  <a:prstClr val="black"/>
+                </a:solidFill>
+                <a:latin typeface="Arial" panose="020B0604020202020204" pitchFamily="34" charset="0"/>
+                <a:cs typeface="Arial" panose="020B0604020202020204" pitchFamily="34" charset="0"/>
+              </a:rPr>
+              <a:t>rows</a:t>
+            </a:r>
+            <a:endParaRPr lang="en-US" altLang="zh-TW" dirty="0" smtClean="0">
+              <a:latin typeface="Arial" panose="020B0604020202020204" pitchFamily="34" charset="0"/>
+              <a:cs typeface="Arial" panose="020B0604020202020204" pitchFamily="34" charset="0"/>
+            </a:endParaRPr>
+          </a:p>
+          <a:p>
+            <a:pPr marL="914400" lvl="2" indent="0">
+              <a:buNone/>
+            </a:pPr>
+            <a:endParaRPr lang="en-US" altLang="zh-TW" dirty="0">
+              <a:latin typeface="Arial" panose="020B0604020202020204" pitchFamily="34" charset="0"/>
+              <a:cs typeface="Arial" panose="020B0604020202020204" pitchFamily="34" charset="0"/>
+            </a:endParaRPr>
           </a:p>
           <a:p>
             <a:endParaRPr lang="zh-TW" altLang="en-US" dirty="0"/>
@@ -10097,7 +12912,7 @@
           <a:graphicData uri="http://schemas.openxmlformats.org/presentationml/2006/ole">
             <mc:AlternateContent xmlns:mc="http://schemas.openxmlformats.org/markup-compatibility/2006">
               <mc:Choice xmlns:v="urn:schemas-microsoft-com:vml" Requires="v">
-                <p:oleObj spid="_x0000_s3075" name="封裝程式殼層物件" showAsIcon="1" r:id="rId4" imgW="696960" imgH="538200" progId="Package">
+                <p:oleObj spid="_x0000_s3083" name="封裝程式殼層物件" showAsIcon="1" r:id="rId4" imgW="696960" imgH="538200" progId="Package">
                   <p:embed/>
                 </p:oleObj>
               </mc:Choice>
@@ -10204,7 +13019,7 @@
         <p:spPr>
           <a:xfrm>
             <a:off x="685800" y="2194560"/>
-            <a:ext cx="11359342" cy="4024125"/>
+            <a:ext cx="11359342" cy="4513811"/>
           </a:xfrm>
         </p:spPr>
         <p:txBody>
@@ -10225,21 +13040,7 @@
                 <a:latin typeface="Arial" panose="020B0604020202020204" pitchFamily="34" charset="0"/>
                 <a:cs typeface="Arial" panose="020B0604020202020204" pitchFamily="34" charset="0"/>
               </a:rPr>
-              <a:t> </a:t>
-            </a:r>
-            <a:r>
-              <a:rPr lang="en-US" altLang="zh-TW" dirty="0" smtClean="0">
-                <a:latin typeface="Arial" panose="020B0604020202020204" pitchFamily="34" charset="0"/>
-                <a:cs typeface="Arial" panose="020B0604020202020204" pitchFamily="34" charset="0"/>
-              </a:rPr>
-              <a:t>: </a:t>
-            </a:r>
-            <a:r>
-              <a:rPr lang="en-US" altLang="zh-TW" dirty="0" smtClean="0">
-                <a:latin typeface="Arial" panose="020B0604020202020204" pitchFamily="34" charset="0"/>
-                <a:cs typeface="Arial" panose="020B0604020202020204" pitchFamily="34" charset="0"/>
-              </a:rPr>
-              <a:t>IBM</a:t>
+              <a:t> : IBM</a:t>
             </a:r>
           </a:p>
           <a:p>
@@ -10423,34 +13224,17 @@
                 <a:latin typeface="Arial" panose="020B0604020202020204" pitchFamily="34" charset="0"/>
                 <a:cs typeface="Arial" panose="020B0604020202020204" pitchFamily="34" charset="0"/>
               </a:rPr>
-              <a:t>Column : </a:t>
+              <a:t>Column : {</a:t>
             </a:r>
             <a:r>
               <a:rPr lang="en-US" altLang="zh-TW" dirty="0" smtClean="0">
+                <a:solidFill>
+                  <a:srgbClr val="C00000"/>
+                </a:solidFill>
                 <a:latin typeface="Arial" panose="020B0604020202020204" pitchFamily="34" charset="0"/>
                 <a:cs typeface="Arial" panose="020B0604020202020204" pitchFamily="34" charset="0"/>
               </a:rPr>
-              <a:t>{</a:t>
-            </a:r>
-            <a:r>
-              <a:rPr lang="en-US" altLang="zh-TW" dirty="0" smtClean="0">
-                <a:solidFill>
-                  <a:srgbClr val="C00000"/>
-                </a:solidFill>
-                <a:latin typeface="Arial" panose="020B0604020202020204" pitchFamily="34" charset="0"/>
-                <a:cs typeface="Arial" panose="020B0604020202020204" pitchFamily="34" charset="0"/>
-              </a:rPr>
-              <a:t>Number</a:t>
-            </a:r>
-            <a:r>
-              <a:rPr lang="en-US" altLang="zh-TW" dirty="0" smtClean="0">
-                <a:solidFill>
-                  <a:srgbClr val="C00000"/>
-                </a:solidFill>
-                <a:latin typeface="Arial" panose="020B0604020202020204" pitchFamily="34" charset="0"/>
-                <a:cs typeface="Arial" panose="020B0604020202020204" pitchFamily="34" charset="0"/>
-              </a:rPr>
-              <a:t> </a:t>
+              <a:t>Number </a:t>
             </a:r>
             <a:r>
               <a:rPr lang="en-US" altLang="zh-TW" dirty="0">
@@ -10613,8 +13397,79 @@
                 <a:latin typeface="Arial" panose="020B0604020202020204" pitchFamily="34" charset="0"/>
                 <a:cs typeface="Arial" panose="020B0604020202020204" pitchFamily="34" charset="0"/>
               </a:rPr>
-              <a:t>	Variation in the confidence = 0.1</a:t>
-            </a:r>
+              <a:t>	Variation in the confidence = </a:t>
+            </a:r>
+            <a:r>
+              <a:rPr lang="en-US" altLang="zh-TW" dirty="0" smtClean="0">
+                <a:latin typeface="Arial" panose="020B0604020202020204" pitchFamily="34" charset="0"/>
+                <a:cs typeface="Arial" panose="020B0604020202020204" pitchFamily="34" charset="0"/>
+              </a:rPr>
+              <a:t>0.1</a:t>
+            </a:r>
+          </a:p>
+          <a:p>
+            <a:pPr marL="0" lvl="0" indent="0">
+              <a:buNone/>
+            </a:pPr>
+            <a:r>
+              <a:rPr lang="en-US" altLang="zh-TW" dirty="0" err="1">
+                <a:solidFill>
+                  <a:prstClr val="black"/>
+                </a:solidFill>
+                <a:latin typeface="Arial" panose="020B0604020202020204" pitchFamily="34" charset="0"/>
+                <a:cs typeface="Arial" panose="020B0604020202020204" pitchFamily="34" charset="0"/>
+              </a:rPr>
+              <a:t>ItemSet</a:t>
+            </a:r>
+            <a:r>
+              <a:rPr lang="en-US" altLang="zh-TW" dirty="0">
+                <a:solidFill>
+                  <a:prstClr val="black"/>
+                </a:solidFill>
+                <a:latin typeface="Arial" panose="020B0604020202020204" pitchFamily="34" charset="0"/>
+                <a:cs typeface="Arial" panose="020B0604020202020204" pitchFamily="34" charset="0"/>
+              </a:rPr>
+              <a:t> : </a:t>
+            </a:r>
+            <a:r>
+              <a:rPr lang="en-US" altLang="zh-TW" dirty="0" smtClean="0">
+                <a:solidFill>
+                  <a:prstClr val="black"/>
+                </a:solidFill>
+                <a:latin typeface="Arial" panose="020B0604020202020204" pitchFamily="34" charset="0"/>
+                <a:cs typeface="Arial" panose="020B0604020202020204" pitchFamily="34" charset="0"/>
+              </a:rPr>
+              <a:t>921</a:t>
+            </a:r>
+            <a:r>
+              <a:rPr lang="zh-TW" altLang="en-US" dirty="0" smtClean="0">
+                <a:solidFill>
+                  <a:prstClr val="black"/>
+                </a:solidFill>
+                <a:latin typeface="Arial" panose="020B0604020202020204" pitchFamily="34" charset="0"/>
+                <a:cs typeface="Arial" panose="020B0604020202020204" pitchFamily="34" charset="0"/>
+              </a:rPr>
+              <a:t> </a:t>
+            </a:r>
+            <a:r>
+              <a:rPr lang="en-US" altLang="zh-TW" dirty="0">
+                <a:solidFill>
+                  <a:prstClr val="black"/>
+                </a:solidFill>
+                <a:latin typeface="Arial" panose="020B0604020202020204" pitchFamily="34" charset="0"/>
+                <a:cs typeface="Arial" panose="020B0604020202020204" pitchFamily="34" charset="0"/>
+              </a:rPr>
+              <a:t>rows</a:t>
+            </a:r>
+            <a:endParaRPr lang="en-US" altLang="zh-TW" dirty="0">
+              <a:latin typeface="Arial" panose="020B0604020202020204" pitchFamily="34" charset="0"/>
+              <a:cs typeface="Arial" panose="020B0604020202020204" pitchFamily="34" charset="0"/>
+            </a:endParaRPr>
+          </a:p>
+          <a:p>
+            <a:pPr marL="0" indent="0">
+              <a:buNone/>
+            </a:pPr>
             <a:endParaRPr lang="zh-TW" altLang="en-US" dirty="0"/>
           </a:p>
         </p:txBody>
@@ -10635,7 +13490,7 @@
           <a:graphicData uri="http://schemas.openxmlformats.org/presentationml/2006/ole">
             <mc:AlternateContent xmlns:mc="http://schemas.openxmlformats.org/markup-compatibility/2006">
               <mc:Choice xmlns:v="urn:schemas-microsoft-com:vml" Requires="v">
-                <p:oleObj spid="_x0000_s4099" name="封裝程式殼層物件" showAsIcon="1" r:id="rId3" imgW="696960" imgH="538200" progId="Package">
+                <p:oleObj spid="_x0000_s4108" name="封裝程式殼層物件" showAsIcon="1" r:id="rId3" imgW="696960" imgH="538200" progId="Package">
                   <p:embed/>
                 </p:oleObj>
               </mc:Choice>
@@ -10779,7 +13634,7 @@
           <a:graphicData uri="http://schemas.openxmlformats.org/presentationml/2006/ole">
             <mc:AlternateContent xmlns:mc="http://schemas.openxmlformats.org/markup-compatibility/2006">
               <mc:Choice xmlns:v="urn:schemas-microsoft-com:vml" Requires="v">
-                <p:oleObj spid="_x0000_s2066" name="工作表" r:id="rId3" imgW="3438557" imgH="2314747" progId="Excel.Sheet.12">
+                <p:oleObj spid="_x0000_s2073" name="工作表" r:id="rId3" imgW="3438557" imgH="2314747" progId="Excel.Sheet.12">
                   <p:embed/>
                 </p:oleObj>
               </mc:Choice>

</xml_diff>